<commit_message>
added 3pages for spa structure and attack models
</commit_message>
<xml_diff>
--- a/slides/Figs/images.pptx
+++ b/slides/Figs/images.pptx
@@ -7,6 +7,8 @@
   <p:sldIdLst>
     <p:sldId id="256" r:id="rId2"/>
     <p:sldId id="257" r:id="rId3"/>
+    <p:sldId id="258" r:id="rId4"/>
+    <p:sldId id="259" r:id="rId5"/>
   </p:sldIdLst>
   <p:sldSz cx="12192000" cy="6858000"/>
   <p:notesSz cx="6858000" cy="9144000"/>
@@ -260,7 +262,7 @@
           <a:p>
             <a:fld id="{ABB50B84-C221-BA49-B172-B6D4747B1BA4}" type="datetimeFigureOut">
               <a:rPr lang="en-US" smtClean="0"/>
-              <a:t>7/29/2019</a:t>
+              <a:t>7/29/19</a:t>
             </a:fld>
             <a:endParaRPr lang="en-US"/>
           </a:p>
@@ -458,7 +460,7 @@
           <a:p>
             <a:fld id="{ABB50B84-C221-BA49-B172-B6D4747B1BA4}" type="datetimeFigureOut">
               <a:rPr lang="en-US" smtClean="0"/>
-              <a:t>7/29/2019</a:t>
+              <a:t>7/29/19</a:t>
             </a:fld>
             <a:endParaRPr lang="en-US"/>
           </a:p>
@@ -666,7 +668,7 @@
           <a:p>
             <a:fld id="{ABB50B84-C221-BA49-B172-B6D4747B1BA4}" type="datetimeFigureOut">
               <a:rPr lang="en-US" smtClean="0"/>
-              <a:t>7/29/2019</a:t>
+              <a:t>7/29/19</a:t>
             </a:fld>
             <a:endParaRPr lang="en-US"/>
           </a:p>
@@ -864,7 +866,7 @@
           <a:p>
             <a:fld id="{ABB50B84-C221-BA49-B172-B6D4747B1BA4}" type="datetimeFigureOut">
               <a:rPr lang="en-US" smtClean="0"/>
-              <a:t>7/29/2019</a:t>
+              <a:t>7/29/19</a:t>
             </a:fld>
             <a:endParaRPr lang="en-US"/>
           </a:p>
@@ -1139,7 +1141,7 @@
           <a:p>
             <a:fld id="{ABB50B84-C221-BA49-B172-B6D4747B1BA4}" type="datetimeFigureOut">
               <a:rPr lang="en-US" smtClean="0"/>
-              <a:t>7/29/2019</a:t>
+              <a:t>7/29/19</a:t>
             </a:fld>
             <a:endParaRPr lang="en-US"/>
           </a:p>
@@ -1404,7 +1406,7 @@
           <a:p>
             <a:fld id="{ABB50B84-C221-BA49-B172-B6D4747B1BA4}" type="datetimeFigureOut">
               <a:rPr lang="en-US" smtClean="0"/>
-              <a:t>7/29/2019</a:t>
+              <a:t>7/29/19</a:t>
             </a:fld>
             <a:endParaRPr lang="en-US"/>
           </a:p>
@@ -1816,7 +1818,7 @@
           <a:p>
             <a:fld id="{ABB50B84-C221-BA49-B172-B6D4747B1BA4}" type="datetimeFigureOut">
               <a:rPr lang="en-US" smtClean="0"/>
-              <a:t>7/29/2019</a:t>
+              <a:t>7/29/19</a:t>
             </a:fld>
             <a:endParaRPr lang="en-US"/>
           </a:p>
@@ -1957,7 +1959,7 @@
           <a:p>
             <a:fld id="{ABB50B84-C221-BA49-B172-B6D4747B1BA4}" type="datetimeFigureOut">
               <a:rPr lang="en-US" smtClean="0"/>
-              <a:t>7/29/2019</a:t>
+              <a:t>7/29/19</a:t>
             </a:fld>
             <a:endParaRPr lang="en-US"/>
           </a:p>
@@ -2070,7 +2072,7 @@
           <a:p>
             <a:fld id="{ABB50B84-C221-BA49-B172-B6D4747B1BA4}" type="datetimeFigureOut">
               <a:rPr lang="en-US" smtClean="0"/>
-              <a:t>7/29/2019</a:t>
+              <a:t>7/29/19</a:t>
             </a:fld>
             <a:endParaRPr lang="en-US"/>
           </a:p>
@@ -2381,7 +2383,7 @@
           <a:p>
             <a:fld id="{ABB50B84-C221-BA49-B172-B6D4747B1BA4}" type="datetimeFigureOut">
               <a:rPr lang="en-US" smtClean="0"/>
-              <a:t>7/29/2019</a:t>
+              <a:t>7/29/19</a:t>
             </a:fld>
             <a:endParaRPr lang="en-US"/>
           </a:p>
@@ -2669,7 +2671,7 @@
           <a:p>
             <a:fld id="{ABB50B84-C221-BA49-B172-B6D4747B1BA4}" type="datetimeFigureOut">
               <a:rPr lang="en-US" smtClean="0"/>
-              <a:t>7/29/2019</a:t>
+              <a:t>7/29/19</a:t>
             </a:fld>
             <a:endParaRPr lang="en-US"/>
           </a:p>
@@ -2910,7 +2912,7 @@
           <a:p>
             <a:fld id="{ABB50B84-C221-BA49-B172-B6D4747B1BA4}" type="datetimeFigureOut">
               <a:rPr lang="en-US" smtClean="0"/>
-              <a:t>7/29/2019</a:t>
+              <a:t>7/29/19</a:t>
             </a:fld>
             <a:endParaRPr lang="en-US"/>
           </a:p>
@@ -4885,13 +4887,13 @@
         </p:nvSpPr>
         <p:spPr>
           <a:xfrm>
-            <a:off x="1774653" y="4637336"/>
+            <a:off x="248131" y="4503476"/>
             <a:ext cx="2659436" cy="789762"/>
           </a:xfrm>
           <a:prstGeom prst="wedgeRoundRectCallout">
             <a:avLst>
-              <a:gd name="adj1" fmla="val 34105"/>
-              <a:gd name="adj2" fmla="val -62723"/>
+              <a:gd name="adj1" fmla="val 36423"/>
+              <a:gd name="adj2" fmla="val -71829"/>
               <a:gd name="adj3" fmla="val 16667"/>
             </a:avLst>
           </a:prstGeom>
@@ -5077,10 +5079,3976 @@
           </a:p>
         </p:txBody>
       </p:sp>
+      <p:sp>
+        <p:nvSpPr>
+          <p:cNvPr id="3" name="TextBox 2">
+            <a:extLst>
+              <a:ext uri="{FF2B5EF4-FFF2-40B4-BE49-F238E27FC236}">
+                <a16:creationId xmlns:a16="http://schemas.microsoft.com/office/drawing/2014/main" id="{78A648DA-79C2-624D-AA63-57BA7351A567}"/>
+              </a:ext>
+            </a:extLst>
+          </p:cNvPr>
+          <p:cNvSpPr txBox="1"/>
+          <p:nvPr/>
+        </p:nvSpPr>
+        <p:spPr>
+          <a:xfrm>
+            <a:off x="418290" y="4126121"/>
+            <a:ext cx="1582228" cy="369332"/>
+          </a:xfrm>
+          <a:prstGeom prst="rect">
+            <a:avLst/>
+          </a:prstGeom>
+          <a:noFill/>
+        </p:spPr>
+        <p:txBody>
+          <a:bodyPr wrap="none" rtlCol="0">
+            <a:spAutoFit/>
+          </a:bodyPr>
+          <a:lstStyle/>
+          <a:p>
+            <a:r>
+              <a:rPr lang="en-US" dirty="0"/>
+              <a:t>User (Browser)</a:t>
+            </a:r>
+          </a:p>
+        </p:txBody>
+      </p:sp>
     </p:spTree>
     <p:extLst>
       <p:ext uri="{BB962C8B-B14F-4D97-AF65-F5344CB8AC3E}">
         <p14:creationId xmlns:p14="http://schemas.microsoft.com/office/powerpoint/2010/main" val="1461578525"/>
+      </p:ext>
+    </p:extLst>
+  </p:cSld>
+  <p:clrMapOvr>
+    <a:masterClrMapping/>
+  </p:clrMapOvr>
+</p:sld>
+</file>
+
+<file path=ppt/slides/slide3.xml><?xml version="1.0" encoding="utf-8"?>
+<p:sld xmlns:a="http://schemas.openxmlformats.org/drawingml/2006/main" xmlns:r="http://schemas.openxmlformats.org/officeDocument/2006/relationships" xmlns:p="http://schemas.openxmlformats.org/presentationml/2006/main">
+  <p:cSld>
+    <p:spTree>
+      <p:nvGrpSpPr>
+        <p:cNvPr id="1" name=""/>
+        <p:cNvGrpSpPr/>
+        <p:nvPr/>
+      </p:nvGrpSpPr>
+      <p:grpSpPr>
+        <a:xfrm>
+          <a:off x="0" y="0"/>
+          <a:ext cx="0" cy="0"/>
+          <a:chOff x="0" y="0"/>
+          <a:chExt cx="0" cy="0"/>
+        </a:xfrm>
+      </p:grpSpPr>
+      <p:sp>
+        <p:nvSpPr>
+          <p:cNvPr id="5" name="Rounded Rectangle 4">
+            <a:extLst>
+              <a:ext uri="{FF2B5EF4-FFF2-40B4-BE49-F238E27FC236}">
+                <a16:creationId xmlns:a16="http://schemas.microsoft.com/office/drawing/2014/main" id="{6E531449-230A-7148-A6E5-B91A61DBBAF9}"/>
+              </a:ext>
+            </a:extLst>
+          </p:cNvPr>
+          <p:cNvSpPr/>
+          <p:nvPr/>
+        </p:nvSpPr>
+        <p:spPr>
+          <a:xfrm>
+            <a:off x="5089132" y="342900"/>
+            <a:ext cx="4784333" cy="3440995"/>
+          </a:xfrm>
+          <a:prstGeom prst="roundRect">
+            <a:avLst/>
+          </a:prstGeom>
+          <a:noFill/>
+          <a:ln w="38100">
+            <a:solidFill>
+              <a:schemeClr val="accent1"/>
+            </a:solidFill>
+          </a:ln>
+        </p:spPr>
+        <p:style>
+          <a:lnRef idx="2">
+            <a:schemeClr val="accent1">
+              <a:shade val="50000"/>
+            </a:schemeClr>
+          </a:lnRef>
+          <a:fillRef idx="1">
+            <a:schemeClr val="accent1"/>
+          </a:fillRef>
+          <a:effectRef idx="0">
+            <a:schemeClr val="accent1"/>
+          </a:effectRef>
+          <a:fontRef idx="minor">
+            <a:schemeClr val="lt1"/>
+          </a:fontRef>
+        </p:style>
+        <p:txBody>
+          <a:bodyPr rtlCol="0" anchor="ctr"/>
+          <a:lstStyle/>
+          <a:p>
+            <a:pPr algn="ctr"/>
+            <a:endParaRPr lang="en-US"/>
+          </a:p>
+        </p:txBody>
+      </p:sp>
+      <p:sp>
+        <p:nvSpPr>
+          <p:cNvPr id="6" name="TextBox 5">
+            <a:extLst>
+              <a:ext uri="{FF2B5EF4-FFF2-40B4-BE49-F238E27FC236}">
+                <a16:creationId xmlns:a16="http://schemas.microsoft.com/office/drawing/2014/main" id="{4A08E93B-DF74-5341-BB01-46A4380C760F}"/>
+              </a:ext>
+            </a:extLst>
+          </p:cNvPr>
+          <p:cNvSpPr txBox="1"/>
+          <p:nvPr/>
+        </p:nvSpPr>
+        <p:spPr>
+          <a:xfrm>
+            <a:off x="6379943" y="6351508"/>
+            <a:ext cx="2674835" cy="369332"/>
+          </a:xfrm>
+          <a:prstGeom prst="rect">
+            <a:avLst/>
+          </a:prstGeom>
+          <a:noFill/>
+        </p:spPr>
+        <p:txBody>
+          <a:bodyPr wrap="none" rtlCol="0">
+            <a:spAutoFit/>
+          </a:bodyPr>
+          <a:lstStyle/>
+          <a:p>
+            <a:pPr algn="ctr"/>
+            <a:r>
+              <a:rPr lang="en-US" altLang="ja-JP" dirty="0"/>
+              <a:t>Cloud</a:t>
+            </a:r>
+            <a:r>
+              <a:rPr lang="ja-JP" altLang="en-US" dirty="0"/>
+              <a:t> </a:t>
+            </a:r>
+            <a:r>
+              <a:rPr lang="en-US" altLang="ja-JP" dirty="0"/>
+              <a:t>platform (e.g., AWS)</a:t>
+            </a:r>
+            <a:endParaRPr lang="en-US" dirty="0"/>
+          </a:p>
+        </p:txBody>
+      </p:sp>
+      <p:pic>
+        <p:nvPicPr>
+          <p:cNvPr id="14" name="Picture 13">
+            <a:extLst>
+              <a:ext uri="{FF2B5EF4-FFF2-40B4-BE49-F238E27FC236}">
+                <a16:creationId xmlns:a16="http://schemas.microsoft.com/office/drawing/2014/main" id="{4C9C6CFB-A5CA-2B47-8998-2F59B37E6832}"/>
+              </a:ext>
+            </a:extLst>
+          </p:cNvPr>
+          <p:cNvPicPr>
+            <a:picLocks noChangeAspect="1"/>
+          </p:cNvPicPr>
+          <p:nvPr/>
+        </p:nvPicPr>
+        <p:blipFill>
+          <a:blip r:embed="rId2">
+            <a:extLst>
+              <a:ext uri="{28A0092B-C50C-407E-A947-70E740481C1C}">
+                <a14:useLocalDpi xmlns:a14="http://schemas.microsoft.com/office/drawing/2010/main" val="0"/>
+              </a:ext>
+            </a:extLst>
+          </a:blip>
+          <a:stretch>
+            <a:fillRect/>
+          </a:stretch>
+        </p:blipFill>
+        <p:spPr>
+          <a:xfrm>
+            <a:off x="5517641" y="1778001"/>
+            <a:ext cx="521366" cy="625640"/>
+          </a:xfrm>
+          <a:prstGeom prst="rect">
+            <a:avLst/>
+          </a:prstGeom>
+        </p:spPr>
+      </p:pic>
+      <p:sp>
+        <p:nvSpPr>
+          <p:cNvPr id="15" name="TextBox 14">
+            <a:extLst>
+              <a:ext uri="{FF2B5EF4-FFF2-40B4-BE49-F238E27FC236}">
+                <a16:creationId xmlns:a16="http://schemas.microsoft.com/office/drawing/2014/main" id="{90737ECB-BA51-494D-B878-65C5981552AC}"/>
+              </a:ext>
+            </a:extLst>
+          </p:cNvPr>
+          <p:cNvSpPr txBox="1"/>
+          <p:nvPr/>
+        </p:nvSpPr>
+        <p:spPr>
+          <a:xfrm>
+            <a:off x="5330948" y="2448800"/>
+            <a:ext cx="894752" cy="155632"/>
+          </a:xfrm>
+          <a:prstGeom prst="rect">
+            <a:avLst/>
+          </a:prstGeom>
+          <a:noFill/>
+        </p:spPr>
+        <p:txBody>
+          <a:bodyPr wrap="square" lIns="0" tIns="0" rIns="0" bIns="0" rtlCol="0" anchor="t">
+            <a:noAutofit/>
+          </a:bodyPr>
+          <a:lstStyle/>
+          <a:p>
+            <a:pPr algn="ctr"/>
+            <a:r>
+              <a:rPr lang="en-US" sz="1000" b="1" dirty="0"/>
+              <a:t>Amazon API Gateway*</a:t>
+            </a:r>
+            <a:endParaRPr lang="en-US" b="1" dirty="0"/>
+          </a:p>
+        </p:txBody>
+      </p:sp>
+      <p:sp>
+        <p:nvSpPr>
+          <p:cNvPr id="16" name="TextBox 15">
+            <a:extLst>
+              <a:ext uri="{FF2B5EF4-FFF2-40B4-BE49-F238E27FC236}">
+                <a16:creationId xmlns:a16="http://schemas.microsoft.com/office/drawing/2014/main" id="{F445D0C1-83C0-B94A-8C46-368940D430C1}"/>
+              </a:ext>
+            </a:extLst>
+          </p:cNvPr>
+          <p:cNvSpPr txBox="1"/>
+          <p:nvPr/>
+        </p:nvSpPr>
+        <p:spPr>
+          <a:xfrm>
+            <a:off x="8632717" y="5140188"/>
+            <a:ext cx="768159" cy="338554"/>
+          </a:xfrm>
+          <a:prstGeom prst="rect">
+            <a:avLst/>
+          </a:prstGeom>
+          <a:noFill/>
+        </p:spPr>
+        <p:txBody>
+          <a:bodyPr wrap="none" rtlCol="0">
+            <a:spAutoFit/>
+          </a:bodyPr>
+          <a:lstStyle/>
+          <a:p>
+            <a:pPr algn="ctr"/>
+            <a:r>
+              <a:rPr lang="en-US" sz="800" b="1" dirty="0">
+                <a:latin typeface="Helvetica Neue"/>
+                <a:cs typeface="Helvetica Neue"/>
+              </a:rPr>
+              <a:t>Amazon S3 </a:t>
+            </a:r>
+            <a:br>
+              <a:rPr lang="en-US" sz="800" b="1" dirty="0">
+                <a:latin typeface="Helvetica Neue"/>
+                <a:cs typeface="Helvetica Neue"/>
+              </a:rPr>
+            </a:br>
+            <a:r>
+              <a:rPr lang="en-US" sz="800" b="1" dirty="0">
+                <a:latin typeface="Helvetica Neue"/>
+                <a:cs typeface="Helvetica Neue"/>
+              </a:rPr>
+              <a:t>bucket</a:t>
+            </a:r>
+          </a:p>
+        </p:txBody>
+      </p:sp>
+      <p:pic>
+        <p:nvPicPr>
+          <p:cNvPr id="17" name="Picture 16">
+            <a:extLst>
+              <a:ext uri="{FF2B5EF4-FFF2-40B4-BE49-F238E27FC236}">
+                <a16:creationId xmlns:a16="http://schemas.microsoft.com/office/drawing/2014/main" id="{7D17C7D3-6C5D-D541-AA07-AA3F2994110A}"/>
+              </a:ext>
+            </a:extLst>
+          </p:cNvPr>
+          <p:cNvPicPr>
+            <a:picLocks noChangeAspect="1"/>
+          </p:cNvPicPr>
+          <p:nvPr/>
+        </p:nvPicPr>
+        <p:blipFill>
+          <a:blip r:embed="rId3">
+            <a:extLst>
+              <a:ext uri="{28A0092B-C50C-407E-A947-70E740481C1C}">
+                <a14:useLocalDpi xmlns:a14="http://schemas.microsoft.com/office/drawing/2010/main" val="0"/>
+              </a:ext>
+            </a:extLst>
+          </a:blip>
+          <a:stretch>
+            <a:fillRect/>
+          </a:stretch>
+        </p:blipFill>
+        <p:spPr>
+          <a:xfrm>
+            <a:off x="8762350" y="4634972"/>
+            <a:ext cx="468336" cy="485681"/>
+          </a:xfrm>
+          <a:prstGeom prst="rect">
+            <a:avLst/>
+          </a:prstGeom>
+        </p:spPr>
+      </p:pic>
+      <p:sp>
+        <p:nvSpPr>
+          <p:cNvPr id="18" name="TextBox 17">
+            <a:extLst>
+              <a:ext uri="{FF2B5EF4-FFF2-40B4-BE49-F238E27FC236}">
+                <a16:creationId xmlns:a16="http://schemas.microsoft.com/office/drawing/2014/main" id="{1AF4C9ED-AE65-F947-B5DC-5DF6F5AF23EE}"/>
+              </a:ext>
+            </a:extLst>
+          </p:cNvPr>
+          <p:cNvSpPr txBox="1"/>
+          <p:nvPr/>
+        </p:nvSpPr>
+        <p:spPr>
+          <a:xfrm>
+            <a:off x="1326570" y="3260420"/>
+            <a:ext cx="822960" cy="320040"/>
+          </a:xfrm>
+          <a:prstGeom prst="rect">
+            <a:avLst/>
+          </a:prstGeom>
+          <a:noFill/>
+        </p:spPr>
+        <p:txBody>
+          <a:bodyPr wrap="none" lIns="0" tIns="0" rIns="0" bIns="0" rtlCol="0" anchor="t">
+            <a:noAutofit/>
+          </a:bodyPr>
+          <a:lstStyle/>
+          <a:p>
+            <a:pPr algn="ctr"/>
+            <a:r>
+              <a:rPr lang="en-US" sz="1100" dirty="0">
+                <a:latin typeface="Helvetica Neue"/>
+                <a:cs typeface="Helvetica Neue"/>
+              </a:rPr>
+              <a:t>JavaScript</a:t>
+            </a:r>
+          </a:p>
+        </p:txBody>
+      </p:sp>
+      <p:pic>
+        <p:nvPicPr>
+          <p:cNvPr id="19" name="Picture 18">
+            <a:extLst>
+              <a:ext uri="{FF2B5EF4-FFF2-40B4-BE49-F238E27FC236}">
+                <a16:creationId xmlns:a16="http://schemas.microsoft.com/office/drawing/2014/main" id="{2A2D865E-3AF3-3A4A-B33F-6D4703908574}"/>
+              </a:ext>
+            </a:extLst>
+          </p:cNvPr>
+          <p:cNvPicPr>
+            <a:picLocks noChangeAspect="1"/>
+          </p:cNvPicPr>
+          <p:nvPr/>
+        </p:nvPicPr>
+        <p:blipFill>
+          <a:blip r:embed="rId4">
+            <a:extLst>
+              <a:ext uri="{28A0092B-C50C-407E-A947-70E740481C1C}">
+                <a14:useLocalDpi xmlns:a14="http://schemas.microsoft.com/office/drawing/2010/main" val="0"/>
+              </a:ext>
+            </a:extLst>
+          </a:blip>
+          <a:stretch>
+            <a:fillRect/>
+          </a:stretch>
+        </p:blipFill>
+        <p:spPr>
+          <a:xfrm>
+            <a:off x="1408191" y="2500745"/>
+            <a:ext cx="659718" cy="759675"/>
+          </a:xfrm>
+          <a:prstGeom prst="rect">
+            <a:avLst/>
+          </a:prstGeom>
+        </p:spPr>
+      </p:pic>
+      <p:pic>
+        <p:nvPicPr>
+          <p:cNvPr id="20" name="Picture 19">
+            <a:extLst>
+              <a:ext uri="{FF2B5EF4-FFF2-40B4-BE49-F238E27FC236}">
+                <a16:creationId xmlns:a16="http://schemas.microsoft.com/office/drawing/2014/main" id="{EDD31DA4-F4CC-1647-AC75-104DA91972AB}"/>
+              </a:ext>
+            </a:extLst>
+          </p:cNvPr>
+          <p:cNvPicPr>
+            <a:picLocks noChangeAspect="1"/>
+          </p:cNvPicPr>
+          <p:nvPr/>
+        </p:nvPicPr>
+        <p:blipFill>
+          <a:blip r:embed="rId5">
+            <a:extLst>
+              <a:ext uri="{28A0092B-C50C-407E-A947-70E740481C1C}">
+                <a14:useLocalDpi xmlns:a14="http://schemas.microsoft.com/office/drawing/2010/main" val="0"/>
+              </a:ext>
+            </a:extLst>
+          </a:blip>
+          <a:stretch>
+            <a:fillRect/>
+          </a:stretch>
+        </p:blipFill>
+        <p:spPr>
+          <a:xfrm>
+            <a:off x="7083627" y="2403641"/>
+            <a:ext cx="544781" cy="653737"/>
+          </a:xfrm>
+          <a:prstGeom prst="rect">
+            <a:avLst/>
+          </a:prstGeom>
+        </p:spPr>
+      </p:pic>
+      <p:sp>
+        <p:nvSpPr>
+          <p:cNvPr id="21" name="TextBox 20">
+            <a:extLst>
+              <a:ext uri="{FF2B5EF4-FFF2-40B4-BE49-F238E27FC236}">
+                <a16:creationId xmlns:a16="http://schemas.microsoft.com/office/drawing/2014/main" id="{D39F4622-C3A9-8041-BE1F-C6EF103DBA55}"/>
+              </a:ext>
+            </a:extLst>
+          </p:cNvPr>
+          <p:cNvSpPr txBox="1"/>
+          <p:nvPr/>
+        </p:nvSpPr>
+        <p:spPr>
+          <a:xfrm>
+            <a:off x="6943514" y="3084565"/>
+            <a:ext cx="825006" cy="155632"/>
+          </a:xfrm>
+          <a:prstGeom prst="rect">
+            <a:avLst/>
+          </a:prstGeom>
+          <a:noFill/>
+        </p:spPr>
+        <p:txBody>
+          <a:bodyPr wrap="square" lIns="0" tIns="0" rIns="0" bIns="0" rtlCol="0" anchor="t">
+            <a:noAutofit/>
+          </a:bodyPr>
+          <a:lstStyle/>
+          <a:p>
+            <a:pPr algn="ctr"/>
+            <a:r>
+              <a:rPr lang="en-US" sz="1000" b="1" dirty="0"/>
+              <a:t>AWS</a:t>
+            </a:r>
+          </a:p>
+          <a:p>
+            <a:pPr algn="ctr"/>
+            <a:r>
+              <a:rPr lang="en-US" sz="1000" b="1" dirty="0"/>
+              <a:t>Lambda</a:t>
+            </a:r>
+          </a:p>
+        </p:txBody>
+      </p:sp>
+      <p:pic>
+        <p:nvPicPr>
+          <p:cNvPr id="22" name="Picture 21">
+            <a:extLst>
+              <a:ext uri="{FF2B5EF4-FFF2-40B4-BE49-F238E27FC236}">
+                <a16:creationId xmlns:a16="http://schemas.microsoft.com/office/drawing/2014/main" id="{D0BD14A0-199D-1D42-A7D9-8D431C87AC85}"/>
+              </a:ext>
+            </a:extLst>
+          </p:cNvPr>
+          <p:cNvPicPr>
+            <a:picLocks noChangeAspect="1"/>
+          </p:cNvPicPr>
+          <p:nvPr/>
+        </p:nvPicPr>
+        <p:blipFill>
+          <a:blip r:embed="rId5">
+            <a:extLst>
+              <a:ext uri="{28A0092B-C50C-407E-A947-70E740481C1C}">
+                <a14:useLocalDpi xmlns:a14="http://schemas.microsoft.com/office/drawing/2010/main" val="0"/>
+              </a:ext>
+            </a:extLst>
+          </a:blip>
+          <a:stretch>
+            <a:fillRect/>
+          </a:stretch>
+        </p:blipFill>
+        <p:spPr>
+          <a:xfrm>
+            <a:off x="7083627" y="1023969"/>
+            <a:ext cx="544781" cy="653737"/>
+          </a:xfrm>
+          <a:prstGeom prst="rect">
+            <a:avLst/>
+          </a:prstGeom>
+        </p:spPr>
+      </p:pic>
+      <p:sp>
+        <p:nvSpPr>
+          <p:cNvPr id="23" name="TextBox 22">
+            <a:extLst>
+              <a:ext uri="{FF2B5EF4-FFF2-40B4-BE49-F238E27FC236}">
+                <a16:creationId xmlns:a16="http://schemas.microsoft.com/office/drawing/2014/main" id="{861917E9-52C3-BF4F-A357-2753D2889030}"/>
+              </a:ext>
+            </a:extLst>
+          </p:cNvPr>
+          <p:cNvSpPr txBox="1"/>
+          <p:nvPr/>
+        </p:nvSpPr>
+        <p:spPr>
+          <a:xfrm>
+            <a:off x="6943514" y="1704893"/>
+            <a:ext cx="825006" cy="155632"/>
+          </a:xfrm>
+          <a:prstGeom prst="rect">
+            <a:avLst/>
+          </a:prstGeom>
+          <a:noFill/>
+        </p:spPr>
+        <p:txBody>
+          <a:bodyPr wrap="square" lIns="0" tIns="0" rIns="0" bIns="0" rtlCol="0" anchor="t">
+            <a:noAutofit/>
+          </a:bodyPr>
+          <a:lstStyle/>
+          <a:p>
+            <a:pPr algn="ctr"/>
+            <a:r>
+              <a:rPr lang="en-US" sz="1000" b="1" dirty="0"/>
+              <a:t>AWS</a:t>
+            </a:r>
+          </a:p>
+          <a:p>
+            <a:pPr algn="ctr"/>
+            <a:r>
+              <a:rPr lang="en-US" sz="1000" b="1" dirty="0"/>
+              <a:t>Lambda</a:t>
+            </a:r>
+          </a:p>
+        </p:txBody>
+      </p:sp>
+      <p:sp>
+        <p:nvSpPr>
+          <p:cNvPr id="24" name="Rounded Rectangle 23">
+            <a:extLst>
+              <a:ext uri="{FF2B5EF4-FFF2-40B4-BE49-F238E27FC236}">
+                <a16:creationId xmlns:a16="http://schemas.microsoft.com/office/drawing/2014/main" id="{531291F4-3B34-2C4A-AABD-C4A14AF0B0BD}"/>
+              </a:ext>
+            </a:extLst>
+          </p:cNvPr>
+          <p:cNvSpPr/>
+          <p:nvPr/>
+        </p:nvSpPr>
+        <p:spPr>
+          <a:xfrm>
+            <a:off x="5089133" y="4176438"/>
+            <a:ext cx="4784333" cy="2091230"/>
+          </a:xfrm>
+          <a:prstGeom prst="roundRect">
+            <a:avLst/>
+          </a:prstGeom>
+          <a:noFill/>
+          <a:ln w="38100">
+            <a:solidFill>
+              <a:srgbClr val="FFC000"/>
+            </a:solidFill>
+          </a:ln>
+        </p:spPr>
+        <p:style>
+          <a:lnRef idx="2">
+            <a:schemeClr val="accent1">
+              <a:shade val="50000"/>
+            </a:schemeClr>
+          </a:lnRef>
+          <a:fillRef idx="1">
+            <a:schemeClr val="accent1"/>
+          </a:fillRef>
+          <a:effectRef idx="0">
+            <a:schemeClr val="accent1"/>
+          </a:effectRef>
+          <a:fontRef idx="minor">
+            <a:schemeClr val="lt1"/>
+          </a:fontRef>
+        </p:style>
+        <p:txBody>
+          <a:bodyPr rtlCol="0" anchor="ctr"/>
+          <a:lstStyle/>
+          <a:p>
+            <a:pPr algn="ctr"/>
+            <a:endParaRPr lang="en-US"/>
+          </a:p>
+        </p:txBody>
+      </p:sp>
+      <p:pic>
+        <p:nvPicPr>
+          <p:cNvPr id="25" name="Picture 24">
+            <a:extLst>
+              <a:ext uri="{FF2B5EF4-FFF2-40B4-BE49-F238E27FC236}">
+                <a16:creationId xmlns:a16="http://schemas.microsoft.com/office/drawing/2014/main" id="{6C3C4A50-D8A6-AD4A-A354-44625FE0AE95}"/>
+              </a:ext>
+            </a:extLst>
+          </p:cNvPr>
+          <p:cNvPicPr>
+            <a:picLocks noChangeAspect="1"/>
+          </p:cNvPicPr>
+          <p:nvPr/>
+        </p:nvPicPr>
+        <p:blipFill>
+          <a:blip r:embed="rId6">
+            <a:extLst>
+              <a:ext uri="{28A0092B-C50C-407E-A947-70E740481C1C}">
+                <a14:useLocalDpi xmlns:a14="http://schemas.microsoft.com/office/drawing/2010/main" val="0"/>
+              </a:ext>
+            </a:extLst>
+          </a:blip>
+          <a:stretch>
+            <a:fillRect/>
+          </a:stretch>
+        </p:blipFill>
+        <p:spPr>
+          <a:xfrm>
+            <a:off x="5626293" y="4566323"/>
+            <a:ext cx="544780" cy="653098"/>
+          </a:xfrm>
+          <a:prstGeom prst="rect">
+            <a:avLst/>
+          </a:prstGeom>
+        </p:spPr>
+      </p:pic>
+      <p:sp>
+        <p:nvSpPr>
+          <p:cNvPr id="26" name="TextBox 25">
+            <a:extLst>
+              <a:ext uri="{FF2B5EF4-FFF2-40B4-BE49-F238E27FC236}">
+                <a16:creationId xmlns:a16="http://schemas.microsoft.com/office/drawing/2014/main" id="{9F66391A-DB00-454C-8C1E-E2C37659FACA}"/>
+              </a:ext>
+            </a:extLst>
+          </p:cNvPr>
+          <p:cNvSpPr txBox="1"/>
+          <p:nvPr/>
+        </p:nvSpPr>
+        <p:spPr>
+          <a:xfrm>
+            <a:off x="5532923" y="5246255"/>
+            <a:ext cx="731520" cy="155632"/>
+          </a:xfrm>
+          <a:prstGeom prst="rect">
+            <a:avLst/>
+          </a:prstGeom>
+          <a:noFill/>
+        </p:spPr>
+        <p:txBody>
+          <a:bodyPr wrap="square" lIns="0" tIns="0" rIns="0" bIns="0" rtlCol="0" anchor="t">
+            <a:noAutofit/>
+          </a:bodyPr>
+          <a:lstStyle/>
+          <a:p>
+            <a:pPr algn="ctr"/>
+            <a:r>
+              <a:rPr lang="en-US" sz="1000" b="1" dirty="0"/>
+              <a:t>Amazon </a:t>
+            </a:r>
+            <a:r>
+              <a:rPr lang="en-US" sz="1000" b="1" dirty="0" err="1"/>
+              <a:t>CloudFront</a:t>
+            </a:r>
+            <a:endParaRPr lang="en-US" b="1" dirty="0"/>
+          </a:p>
+        </p:txBody>
+      </p:sp>
+      <p:pic>
+        <p:nvPicPr>
+          <p:cNvPr id="27" name="Picture 26">
+            <a:extLst>
+              <a:ext uri="{FF2B5EF4-FFF2-40B4-BE49-F238E27FC236}">
+                <a16:creationId xmlns:a16="http://schemas.microsoft.com/office/drawing/2014/main" id="{1EAD9C27-2362-DA43-96BA-B9A7DEFB7F2C}"/>
+              </a:ext>
+            </a:extLst>
+          </p:cNvPr>
+          <p:cNvPicPr>
+            <a:picLocks noChangeAspect="1"/>
+          </p:cNvPicPr>
+          <p:nvPr/>
+        </p:nvPicPr>
+        <p:blipFill>
+          <a:blip r:embed="rId7">
+            <a:extLst>
+              <a:ext uri="{28A0092B-C50C-407E-A947-70E740481C1C}">
+                <a14:useLocalDpi xmlns:a14="http://schemas.microsoft.com/office/drawing/2010/main" val="0"/>
+              </a:ext>
+            </a:extLst>
+          </a:blip>
+          <a:stretch>
+            <a:fillRect/>
+          </a:stretch>
+        </p:blipFill>
+        <p:spPr>
+          <a:xfrm>
+            <a:off x="8681766" y="1023969"/>
+            <a:ext cx="543466" cy="601994"/>
+          </a:xfrm>
+          <a:prstGeom prst="rect">
+            <a:avLst/>
+          </a:prstGeom>
+        </p:spPr>
+      </p:pic>
+      <p:sp>
+        <p:nvSpPr>
+          <p:cNvPr id="28" name="TextBox 27">
+            <a:extLst>
+              <a:ext uri="{FF2B5EF4-FFF2-40B4-BE49-F238E27FC236}">
+                <a16:creationId xmlns:a16="http://schemas.microsoft.com/office/drawing/2014/main" id="{248112C3-DC6B-3B4B-9DA8-3F113B57B059}"/>
+              </a:ext>
+            </a:extLst>
+          </p:cNvPr>
+          <p:cNvSpPr txBox="1"/>
+          <p:nvPr/>
+        </p:nvSpPr>
+        <p:spPr>
+          <a:xfrm>
+            <a:off x="8506124" y="1674372"/>
+            <a:ext cx="894752" cy="155632"/>
+          </a:xfrm>
+          <a:prstGeom prst="rect">
+            <a:avLst/>
+          </a:prstGeom>
+          <a:noFill/>
+        </p:spPr>
+        <p:txBody>
+          <a:bodyPr wrap="square" lIns="0" tIns="0" rIns="0" bIns="0" rtlCol="0" anchor="t">
+            <a:noAutofit/>
+          </a:bodyPr>
+          <a:lstStyle/>
+          <a:p>
+            <a:pPr algn="ctr"/>
+            <a:r>
+              <a:rPr lang="en-US" sz="1000" b="1" dirty="0"/>
+              <a:t>Amazon</a:t>
+            </a:r>
+            <a:br>
+              <a:rPr lang="en-US" sz="1000" b="1" dirty="0"/>
+            </a:br>
+            <a:r>
+              <a:rPr lang="en-US" sz="1000" b="1" dirty="0" err="1"/>
+              <a:t>DynamoDB</a:t>
+            </a:r>
+            <a:endParaRPr lang="en-US" b="1" dirty="0"/>
+          </a:p>
+        </p:txBody>
+      </p:sp>
+      <p:sp>
+        <p:nvSpPr>
+          <p:cNvPr id="29" name="TextBox 28">
+            <a:extLst>
+              <a:ext uri="{FF2B5EF4-FFF2-40B4-BE49-F238E27FC236}">
+                <a16:creationId xmlns:a16="http://schemas.microsoft.com/office/drawing/2014/main" id="{CA00FEFD-8243-0040-B3A2-F7D5AECB291C}"/>
+              </a:ext>
+            </a:extLst>
+          </p:cNvPr>
+          <p:cNvSpPr txBox="1"/>
+          <p:nvPr/>
+        </p:nvSpPr>
+        <p:spPr>
+          <a:xfrm>
+            <a:off x="8603917" y="3027749"/>
+            <a:ext cx="768159" cy="338554"/>
+          </a:xfrm>
+          <a:prstGeom prst="rect">
+            <a:avLst/>
+          </a:prstGeom>
+          <a:noFill/>
+        </p:spPr>
+        <p:txBody>
+          <a:bodyPr wrap="none" rtlCol="0">
+            <a:spAutoFit/>
+          </a:bodyPr>
+          <a:lstStyle/>
+          <a:p>
+            <a:pPr algn="ctr"/>
+            <a:r>
+              <a:rPr lang="en-US" sz="800" b="1" dirty="0">
+                <a:latin typeface="Helvetica Neue"/>
+                <a:cs typeface="Helvetica Neue"/>
+              </a:rPr>
+              <a:t>Amazon S3 </a:t>
+            </a:r>
+            <a:br>
+              <a:rPr lang="en-US" sz="800" b="1" dirty="0">
+                <a:latin typeface="Helvetica Neue"/>
+                <a:cs typeface="Helvetica Neue"/>
+              </a:rPr>
+            </a:br>
+            <a:r>
+              <a:rPr lang="en-US" sz="800" b="1" dirty="0">
+                <a:latin typeface="Helvetica Neue"/>
+                <a:cs typeface="Helvetica Neue"/>
+              </a:rPr>
+              <a:t>bucket</a:t>
+            </a:r>
+          </a:p>
+        </p:txBody>
+      </p:sp>
+      <p:pic>
+        <p:nvPicPr>
+          <p:cNvPr id="30" name="Picture 29">
+            <a:extLst>
+              <a:ext uri="{FF2B5EF4-FFF2-40B4-BE49-F238E27FC236}">
+                <a16:creationId xmlns:a16="http://schemas.microsoft.com/office/drawing/2014/main" id="{A2B5F8E6-C0CD-2841-83B2-287019773EED}"/>
+              </a:ext>
+            </a:extLst>
+          </p:cNvPr>
+          <p:cNvPicPr>
+            <a:picLocks noChangeAspect="1"/>
+          </p:cNvPicPr>
+          <p:nvPr/>
+        </p:nvPicPr>
+        <p:blipFill>
+          <a:blip r:embed="rId3">
+            <a:extLst>
+              <a:ext uri="{28A0092B-C50C-407E-A947-70E740481C1C}">
+                <a14:useLocalDpi xmlns:a14="http://schemas.microsoft.com/office/drawing/2010/main" val="0"/>
+              </a:ext>
+            </a:extLst>
+          </a:blip>
+          <a:stretch>
+            <a:fillRect/>
+          </a:stretch>
+        </p:blipFill>
+        <p:spPr>
+          <a:xfrm>
+            <a:off x="8733550" y="2522533"/>
+            <a:ext cx="468336" cy="485681"/>
+          </a:xfrm>
+          <a:prstGeom prst="rect">
+            <a:avLst/>
+          </a:prstGeom>
+        </p:spPr>
+      </p:pic>
+      <p:sp>
+        <p:nvSpPr>
+          <p:cNvPr id="34" name="TextBox 33">
+            <a:extLst>
+              <a:ext uri="{FF2B5EF4-FFF2-40B4-BE49-F238E27FC236}">
+                <a16:creationId xmlns:a16="http://schemas.microsoft.com/office/drawing/2014/main" id="{F4A3583D-6F24-F040-84EC-46AFBD477E43}"/>
+              </a:ext>
+            </a:extLst>
+          </p:cNvPr>
+          <p:cNvSpPr txBox="1"/>
+          <p:nvPr/>
+        </p:nvSpPr>
+        <p:spPr>
+          <a:xfrm>
+            <a:off x="5078059" y="3372035"/>
+            <a:ext cx="4784333" cy="369332"/>
+          </a:xfrm>
+          <a:prstGeom prst="rect">
+            <a:avLst/>
+          </a:prstGeom>
+          <a:noFill/>
+        </p:spPr>
+        <p:txBody>
+          <a:bodyPr wrap="square" rtlCol="0">
+            <a:spAutoFit/>
+          </a:bodyPr>
+          <a:lstStyle/>
+          <a:p>
+            <a:pPr algn="ctr"/>
+            <a:r>
+              <a:rPr lang="en-US" dirty="0"/>
+              <a:t>Computing &amp; Data resources</a:t>
+            </a:r>
+          </a:p>
+        </p:txBody>
+      </p:sp>
+      <p:sp>
+        <p:nvSpPr>
+          <p:cNvPr id="35" name="TextBox 34">
+            <a:extLst>
+              <a:ext uri="{FF2B5EF4-FFF2-40B4-BE49-F238E27FC236}">
+                <a16:creationId xmlns:a16="http://schemas.microsoft.com/office/drawing/2014/main" id="{0BBD4DDF-4571-C747-8394-0CEEA83D81DD}"/>
+              </a:ext>
+            </a:extLst>
+          </p:cNvPr>
+          <p:cNvSpPr txBox="1"/>
+          <p:nvPr/>
+        </p:nvSpPr>
+        <p:spPr>
+          <a:xfrm>
+            <a:off x="5089132" y="5608914"/>
+            <a:ext cx="4784333" cy="646331"/>
+          </a:xfrm>
+          <a:prstGeom prst="rect">
+            <a:avLst/>
+          </a:prstGeom>
+          <a:noFill/>
+        </p:spPr>
+        <p:txBody>
+          <a:bodyPr wrap="square" rtlCol="0">
+            <a:spAutoFit/>
+          </a:bodyPr>
+          <a:lstStyle/>
+          <a:p>
+            <a:pPr algn="ctr"/>
+            <a:r>
+              <a:rPr lang="en-US" dirty="0"/>
+              <a:t>Static webpage (html/</a:t>
+            </a:r>
+            <a:r>
+              <a:rPr lang="en-US" dirty="0" err="1"/>
+              <a:t>css</a:t>
+            </a:r>
+            <a:r>
+              <a:rPr lang="en-US" dirty="0"/>
+              <a:t>/</a:t>
+            </a:r>
+            <a:r>
+              <a:rPr lang="en-US" dirty="0" err="1"/>
+              <a:t>javascrip</a:t>
+            </a:r>
+            <a:r>
+              <a:rPr lang="en-US" dirty="0"/>
+              <a:t>)</a:t>
+            </a:r>
+          </a:p>
+          <a:p>
+            <a:pPr algn="ctr"/>
+            <a:r>
+              <a:rPr lang="en-US" dirty="0"/>
+              <a:t> as downloadable program</a:t>
+            </a:r>
+          </a:p>
+        </p:txBody>
+      </p:sp>
+      <p:sp>
+        <p:nvSpPr>
+          <p:cNvPr id="2" name="テキスト ボックス 1">
+            <a:extLst>
+              <a:ext uri="{FF2B5EF4-FFF2-40B4-BE49-F238E27FC236}">
+                <a16:creationId xmlns:a16="http://schemas.microsoft.com/office/drawing/2014/main" id="{727334F1-3609-4512-A307-4472AC0318BD}"/>
+              </a:ext>
+            </a:extLst>
+          </p:cNvPr>
+          <p:cNvSpPr txBox="1"/>
+          <p:nvPr/>
+        </p:nvSpPr>
+        <p:spPr>
+          <a:xfrm>
+            <a:off x="5171278" y="1468078"/>
+            <a:ext cx="1333378" cy="369332"/>
+          </a:xfrm>
+          <a:prstGeom prst="rect">
+            <a:avLst/>
+          </a:prstGeom>
+          <a:noFill/>
+        </p:spPr>
+        <p:txBody>
+          <a:bodyPr wrap="none" rtlCol="0">
+            <a:spAutoFit/>
+          </a:bodyPr>
+          <a:lstStyle/>
+          <a:p>
+            <a:r>
+              <a:rPr kumimoji="1" lang="en-US" altLang="ja-JP" dirty="0"/>
+              <a:t>RESTful APIs</a:t>
+            </a:r>
+            <a:endParaRPr kumimoji="1" lang="ja-JP" altLang="en-US" dirty="0"/>
+          </a:p>
+        </p:txBody>
+      </p:sp>
+      <p:sp>
+        <p:nvSpPr>
+          <p:cNvPr id="31" name="テキスト ボックス 30">
+            <a:extLst>
+              <a:ext uri="{FF2B5EF4-FFF2-40B4-BE49-F238E27FC236}">
+                <a16:creationId xmlns:a16="http://schemas.microsoft.com/office/drawing/2014/main" id="{86353896-446E-421E-AEA0-EF4514990CF4}"/>
+              </a:ext>
+            </a:extLst>
+          </p:cNvPr>
+          <p:cNvSpPr txBox="1"/>
+          <p:nvPr/>
+        </p:nvSpPr>
+        <p:spPr>
+          <a:xfrm>
+            <a:off x="5618247" y="4275463"/>
+            <a:ext cx="599844" cy="369332"/>
+          </a:xfrm>
+          <a:prstGeom prst="rect">
+            <a:avLst/>
+          </a:prstGeom>
+          <a:noFill/>
+        </p:spPr>
+        <p:txBody>
+          <a:bodyPr wrap="none" rtlCol="0">
+            <a:spAutoFit/>
+          </a:bodyPr>
+          <a:lstStyle/>
+          <a:p>
+            <a:r>
+              <a:rPr kumimoji="1" lang="en-US" altLang="ja-JP" dirty="0"/>
+              <a:t>CDN</a:t>
+            </a:r>
+            <a:endParaRPr kumimoji="1" lang="ja-JP" altLang="en-US" dirty="0"/>
+          </a:p>
+        </p:txBody>
+      </p:sp>
+      <p:cxnSp>
+        <p:nvCxnSpPr>
+          <p:cNvPr id="4" name="直線矢印コネクタ 3">
+            <a:extLst>
+              <a:ext uri="{FF2B5EF4-FFF2-40B4-BE49-F238E27FC236}">
+                <a16:creationId xmlns:a16="http://schemas.microsoft.com/office/drawing/2014/main" id="{537AD1F6-3C92-4886-BED4-61D71C6D19D4}"/>
+              </a:ext>
+            </a:extLst>
+          </p:cNvPr>
+          <p:cNvCxnSpPr>
+            <a:cxnSpLocks/>
+            <a:stCxn id="25" idx="1"/>
+            <a:endCxn id="13" idx="3"/>
+          </p:cNvCxnSpPr>
+          <p:nvPr/>
+        </p:nvCxnSpPr>
+        <p:spPr>
+          <a:xfrm flipH="1" flipV="1">
+            <a:off x="1774653" y="3806355"/>
+            <a:ext cx="3851640" cy="1086517"/>
+          </a:xfrm>
+          <a:prstGeom prst="straightConnector1">
+            <a:avLst/>
+          </a:prstGeom>
+          <a:ln w="38100">
+            <a:solidFill>
+              <a:srgbClr val="FFC000"/>
+            </a:solidFill>
+            <a:tailEnd type="triangle"/>
+          </a:ln>
+        </p:spPr>
+        <p:style>
+          <a:lnRef idx="1">
+            <a:schemeClr val="accent1"/>
+          </a:lnRef>
+          <a:fillRef idx="0">
+            <a:schemeClr val="accent1"/>
+          </a:fillRef>
+          <a:effectRef idx="0">
+            <a:schemeClr val="accent1"/>
+          </a:effectRef>
+          <a:fontRef idx="minor">
+            <a:schemeClr val="tx1"/>
+          </a:fontRef>
+        </p:style>
+      </p:cxnSp>
+      <p:cxnSp>
+        <p:nvCxnSpPr>
+          <p:cNvPr id="32" name="直線矢印コネクタ 31">
+            <a:extLst>
+              <a:ext uri="{FF2B5EF4-FFF2-40B4-BE49-F238E27FC236}">
+                <a16:creationId xmlns:a16="http://schemas.microsoft.com/office/drawing/2014/main" id="{0EF9CDA6-1C3C-4B7F-8C6E-2B0DD079E74C}"/>
+              </a:ext>
+            </a:extLst>
+          </p:cNvPr>
+          <p:cNvCxnSpPr>
+            <a:cxnSpLocks/>
+            <a:stCxn id="17" idx="1"/>
+            <a:endCxn id="25" idx="3"/>
+          </p:cNvCxnSpPr>
+          <p:nvPr/>
+        </p:nvCxnSpPr>
+        <p:spPr>
+          <a:xfrm flipH="1">
+            <a:off x="6171073" y="4877813"/>
+            <a:ext cx="2591277" cy="15059"/>
+          </a:xfrm>
+          <a:prstGeom prst="straightConnector1">
+            <a:avLst/>
+          </a:prstGeom>
+          <a:ln w="38100">
+            <a:solidFill>
+              <a:srgbClr val="FFC000"/>
+            </a:solidFill>
+            <a:tailEnd type="triangle"/>
+          </a:ln>
+        </p:spPr>
+        <p:style>
+          <a:lnRef idx="1">
+            <a:schemeClr val="accent1"/>
+          </a:lnRef>
+          <a:fillRef idx="0">
+            <a:schemeClr val="accent1"/>
+          </a:fillRef>
+          <a:effectRef idx="0">
+            <a:schemeClr val="accent1"/>
+          </a:effectRef>
+          <a:fontRef idx="minor">
+            <a:schemeClr val="tx1"/>
+          </a:fontRef>
+        </p:style>
+      </p:cxnSp>
+      <p:pic>
+        <p:nvPicPr>
+          <p:cNvPr id="13" name="図 12">
+            <a:extLst>
+              <a:ext uri="{FF2B5EF4-FFF2-40B4-BE49-F238E27FC236}">
+                <a16:creationId xmlns:a16="http://schemas.microsoft.com/office/drawing/2014/main" id="{9A12ED07-FB85-4F72-987E-AE9C178D6BF0}"/>
+              </a:ext>
+            </a:extLst>
+          </p:cNvPr>
+          <p:cNvPicPr>
+            <a:picLocks noChangeAspect="1"/>
+          </p:cNvPicPr>
+          <p:nvPr/>
+        </p:nvPicPr>
+        <p:blipFill>
+          <a:blip r:embed="rId8"/>
+          <a:stretch>
+            <a:fillRect/>
+          </a:stretch>
+        </p:blipFill>
+        <p:spPr>
+          <a:xfrm>
+            <a:off x="644154" y="3429000"/>
+            <a:ext cx="1130499" cy="754710"/>
+          </a:xfrm>
+          <a:prstGeom prst="rect">
+            <a:avLst/>
+          </a:prstGeom>
+        </p:spPr>
+      </p:pic>
+      <p:cxnSp>
+        <p:nvCxnSpPr>
+          <p:cNvPr id="37" name="直線矢印コネクタ 36">
+            <a:extLst>
+              <a:ext uri="{FF2B5EF4-FFF2-40B4-BE49-F238E27FC236}">
+                <a16:creationId xmlns:a16="http://schemas.microsoft.com/office/drawing/2014/main" id="{6F0D0DE8-0BFE-4880-86DD-DB262B89D35B}"/>
+              </a:ext>
+            </a:extLst>
+          </p:cNvPr>
+          <p:cNvCxnSpPr>
+            <a:cxnSpLocks/>
+            <a:endCxn id="14" idx="1"/>
+          </p:cNvCxnSpPr>
+          <p:nvPr/>
+        </p:nvCxnSpPr>
+        <p:spPr>
+          <a:xfrm flipV="1">
+            <a:off x="1823804" y="2090821"/>
+            <a:ext cx="3693837" cy="1481937"/>
+          </a:xfrm>
+          <a:prstGeom prst="straightConnector1">
+            <a:avLst/>
+          </a:prstGeom>
+          <a:ln w="38100">
+            <a:headEnd type="triangle" w="med" len="med"/>
+            <a:tailEnd type="triangle" w="med" len="med"/>
+          </a:ln>
+        </p:spPr>
+        <p:style>
+          <a:lnRef idx="1">
+            <a:schemeClr val="accent1"/>
+          </a:lnRef>
+          <a:fillRef idx="0">
+            <a:schemeClr val="accent1"/>
+          </a:fillRef>
+          <a:effectRef idx="0">
+            <a:schemeClr val="accent1"/>
+          </a:effectRef>
+          <a:fontRef idx="minor">
+            <a:schemeClr val="tx1"/>
+          </a:fontRef>
+        </p:style>
+      </p:cxnSp>
+      <p:sp>
+        <p:nvSpPr>
+          <p:cNvPr id="40" name="テキスト ボックス 39">
+            <a:extLst>
+              <a:ext uri="{FF2B5EF4-FFF2-40B4-BE49-F238E27FC236}">
+                <a16:creationId xmlns:a16="http://schemas.microsoft.com/office/drawing/2014/main" id="{4E384F71-7760-4FC1-A345-1759ECA46887}"/>
+              </a:ext>
+            </a:extLst>
+          </p:cNvPr>
+          <p:cNvSpPr txBox="1"/>
+          <p:nvPr/>
+        </p:nvSpPr>
+        <p:spPr>
+          <a:xfrm>
+            <a:off x="6766137" y="391945"/>
+            <a:ext cx="1218603" cy="646331"/>
+          </a:xfrm>
+          <a:prstGeom prst="rect">
+            <a:avLst/>
+          </a:prstGeom>
+          <a:noFill/>
+        </p:spPr>
+        <p:txBody>
+          <a:bodyPr wrap="none" rtlCol="0">
+            <a:spAutoFit/>
+          </a:bodyPr>
+          <a:lstStyle/>
+          <a:p>
+            <a:pPr algn="ctr"/>
+            <a:r>
+              <a:rPr kumimoji="1" lang="en-US" altLang="ja-JP" dirty="0"/>
+              <a:t>Computing</a:t>
+            </a:r>
+          </a:p>
+          <a:p>
+            <a:pPr algn="ctr"/>
+            <a:r>
+              <a:rPr kumimoji="1" lang="en-US" altLang="ja-JP" dirty="0"/>
+              <a:t>Functions</a:t>
+            </a:r>
+            <a:endParaRPr kumimoji="1" lang="ja-JP" altLang="en-US" dirty="0"/>
+          </a:p>
+        </p:txBody>
+      </p:sp>
+      <p:sp>
+        <p:nvSpPr>
+          <p:cNvPr id="41" name="テキスト ボックス 40">
+            <a:extLst>
+              <a:ext uri="{FF2B5EF4-FFF2-40B4-BE49-F238E27FC236}">
+                <a16:creationId xmlns:a16="http://schemas.microsoft.com/office/drawing/2014/main" id="{4FF9138F-6997-4E8E-9D48-F61143AB07AB}"/>
+              </a:ext>
+            </a:extLst>
+          </p:cNvPr>
+          <p:cNvSpPr txBox="1"/>
+          <p:nvPr/>
+        </p:nvSpPr>
+        <p:spPr>
+          <a:xfrm>
+            <a:off x="8400610" y="351204"/>
+            <a:ext cx="1134221" cy="646331"/>
+          </a:xfrm>
+          <a:prstGeom prst="rect">
+            <a:avLst/>
+          </a:prstGeom>
+          <a:noFill/>
+        </p:spPr>
+        <p:txBody>
+          <a:bodyPr wrap="none" rtlCol="0">
+            <a:spAutoFit/>
+          </a:bodyPr>
+          <a:lstStyle/>
+          <a:p>
+            <a:pPr algn="ctr"/>
+            <a:r>
+              <a:rPr kumimoji="1" lang="en-US" altLang="ja-JP" dirty="0"/>
+              <a:t>Data</a:t>
+            </a:r>
+            <a:br>
+              <a:rPr kumimoji="1" lang="en-US" altLang="ja-JP" dirty="0"/>
+            </a:br>
+            <a:r>
+              <a:rPr kumimoji="1" lang="en-US" altLang="ja-JP" dirty="0"/>
+              <a:t>Resources</a:t>
+            </a:r>
+            <a:endParaRPr kumimoji="1" lang="ja-JP" altLang="en-US" dirty="0"/>
+          </a:p>
+        </p:txBody>
+      </p:sp>
+      <p:cxnSp>
+        <p:nvCxnSpPr>
+          <p:cNvPr id="42" name="直線矢印コネクタ 41">
+            <a:extLst>
+              <a:ext uri="{FF2B5EF4-FFF2-40B4-BE49-F238E27FC236}">
+                <a16:creationId xmlns:a16="http://schemas.microsoft.com/office/drawing/2014/main" id="{83FE3D88-58AE-46A0-9004-D88BE4C03678}"/>
+              </a:ext>
+            </a:extLst>
+          </p:cNvPr>
+          <p:cNvCxnSpPr>
+            <a:cxnSpLocks/>
+            <a:stCxn id="14" idx="3"/>
+            <a:endCxn id="22" idx="1"/>
+          </p:cNvCxnSpPr>
+          <p:nvPr/>
+        </p:nvCxnSpPr>
+        <p:spPr>
+          <a:xfrm flipV="1">
+            <a:off x="6039007" y="1350838"/>
+            <a:ext cx="1044620" cy="739983"/>
+          </a:xfrm>
+          <a:prstGeom prst="straightConnector1">
+            <a:avLst/>
+          </a:prstGeom>
+          <a:ln w="38100">
+            <a:headEnd type="triangle" w="med" len="med"/>
+            <a:tailEnd type="triangle" w="med" len="med"/>
+          </a:ln>
+        </p:spPr>
+        <p:style>
+          <a:lnRef idx="1">
+            <a:schemeClr val="accent1"/>
+          </a:lnRef>
+          <a:fillRef idx="0">
+            <a:schemeClr val="accent1"/>
+          </a:fillRef>
+          <a:effectRef idx="0">
+            <a:schemeClr val="accent1"/>
+          </a:effectRef>
+          <a:fontRef idx="minor">
+            <a:schemeClr val="tx1"/>
+          </a:fontRef>
+        </p:style>
+      </p:cxnSp>
+      <p:cxnSp>
+        <p:nvCxnSpPr>
+          <p:cNvPr id="45" name="直線矢印コネクタ 44">
+            <a:extLst>
+              <a:ext uri="{FF2B5EF4-FFF2-40B4-BE49-F238E27FC236}">
+                <a16:creationId xmlns:a16="http://schemas.microsoft.com/office/drawing/2014/main" id="{66B3B0F4-119C-468D-9005-236BAA551BE5}"/>
+              </a:ext>
+            </a:extLst>
+          </p:cNvPr>
+          <p:cNvCxnSpPr>
+            <a:cxnSpLocks/>
+            <a:stCxn id="14" idx="3"/>
+            <a:endCxn id="20" idx="1"/>
+          </p:cNvCxnSpPr>
+          <p:nvPr/>
+        </p:nvCxnSpPr>
+        <p:spPr>
+          <a:xfrm>
+            <a:off x="6039007" y="2090821"/>
+            <a:ext cx="1044620" cy="639689"/>
+          </a:xfrm>
+          <a:prstGeom prst="straightConnector1">
+            <a:avLst/>
+          </a:prstGeom>
+          <a:ln w="38100">
+            <a:headEnd type="triangle" w="med" len="med"/>
+            <a:tailEnd type="triangle" w="med" len="med"/>
+          </a:ln>
+        </p:spPr>
+        <p:style>
+          <a:lnRef idx="1">
+            <a:schemeClr val="accent1"/>
+          </a:lnRef>
+          <a:fillRef idx="0">
+            <a:schemeClr val="accent1"/>
+          </a:fillRef>
+          <a:effectRef idx="0">
+            <a:schemeClr val="accent1"/>
+          </a:effectRef>
+          <a:fontRef idx="minor">
+            <a:schemeClr val="tx1"/>
+          </a:fontRef>
+        </p:style>
+      </p:cxnSp>
+      <p:cxnSp>
+        <p:nvCxnSpPr>
+          <p:cNvPr id="52" name="直線矢印コネクタ 51">
+            <a:extLst>
+              <a:ext uri="{FF2B5EF4-FFF2-40B4-BE49-F238E27FC236}">
+                <a16:creationId xmlns:a16="http://schemas.microsoft.com/office/drawing/2014/main" id="{CFC2C1FB-7A06-4253-97A5-04BC941673FF}"/>
+              </a:ext>
+            </a:extLst>
+          </p:cNvPr>
+          <p:cNvCxnSpPr>
+            <a:cxnSpLocks/>
+          </p:cNvCxnSpPr>
+          <p:nvPr/>
+        </p:nvCxnSpPr>
+        <p:spPr>
+          <a:xfrm>
+            <a:off x="7706256" y="1350838"/>
+            <a:ext cx="941540" cy="1300380"/>
+          </a:xfrm>
+          <a:prstGeom prst="straightConnector1">
+            <a:avLst/>
+          </a:prstGeom>
+          <a:ln w="38100">
+            <a:headEnd type="triangle" w="med" len="med"/>
+            <a:tailEnd type="triangle" w="med" len="med"/>
+          </a:ln>
+        </p:spPr>
+        <p:style>
+          <a:lnRef idx="1">
+            <a:schemeClr val="accent1"/>
+          </a:lnRef>
+          <a:fillRef idx="0">
+            <a:schemeClr val="accent1"/>
+          </a:fillRef>
+          <a:effectRef idx="0">
+            <a:schemeClr val="accent1"/>
+          </a:effectRef>
+          <a:fontRef idx="minor">
+            <a:schemeClr val="tx1"/>
+          </a:fontRef>
+        </p:style>
+      </p:cxnSp>
+      <p:cxnSp>
+        <p:nvCxnSpPr>
+          <p:cNvPr id="55" name="直線矢印コネクタ 54">
+            <a:extLst>
+              <a:ext uri="{FF2B5EF4-FFF2-40B4-BE49-F238E27FC236}">
+                <a16:creationId xmlns:a16="http://schemas.microsoft.com/office/drawing/2014/main" id="{2CBAC8D1-83D9-4A7D-905D-8ABEBEEDCBD8}"/>
+              </a:ext>
+            </a:extLst>
+          </p:cNvPr>
+          <p:cNvCxnSpPr>
+            <a:cxnSpLocks/>
+          </p:cNvCxnSpPr>
+          <p:nvPr/>
+        </p:nvCxnSpPr>
+        <p:spPr>
+          <a:xfrm flipH="1">
+            <a:off x="7710611" y="1379258"/>
+            <a:ext cx="893307" cy="1225174"/>
+          </a:xfrm>
+          <a:prstGeom prst="straightConnector1">
+            <a:avLst/>
+          </a:prstGeom>
+          <a:ln w="38100">
+            <a:headEnd type="triangle" w="med" len="med"/>
+            <a:tailEnd type="triangle" w="med" len="med"/>
+          </a:ln>
+        </p:spPr>
+        <p:style>
+          <a:lnRef idx="1">
+            <a:schemeClr val="accent1"/>
+          </a:lnRef>
+          <a:fillRef idx="0">
+            <a:schemeClr val="accent1"/>
+          </a:fillRef>
+          <a:effectRef idx="0">
+            <a:schemeClr val="accent1"/>
+          </a:effectRef>
+          <a:fontRef idx="minor">
+            <a:schemeClr val="tx1"/>
+          </a:fontRef>
+        </p:style>
+      </p:cxnSp>
+      <p:cxnSp>
+        <p:nvCxnSpPr>
+          <p:cNvPr id="58" name="直線矢印コネクタ 57">
+            <a:extLst>
+              <a:ext uri="{FF2B5EF4-FFF2-40B4-BE49-F238E27FC236}">
+                <a16:creationId xmlns:a16="http://schemas.microsoft.com/office/drawing/2014/main" id="{5B4584A1-7FAE-4069-8E67-A90889FC979C}"/>
+              </a:ext>
+            </a:extLst>
+          </p:cNvPr>
+          <p:cNvCxnSpPr>
+            <a:cxnSpLocks/>
+          </p:cNvCxnSpPr>
+          <p:nvPr/>
+        </p:nvCxnSpPr>
+        <p:spPr>
+          <a:xfrm flipH="1">
+            <a:off x="7650609" y="1296629"/>
+            <a:ext cx="973618" cy="1"/>
+          </a:xfrm>
+          <a:prstGeom prst="straightConnector1">
+            <a:avLst/>
+          </a:prstGeom>
+          <a:ln w="38100">
+            <a:headEnd type="triangle" w="med" len="med"/>
+            <a:tailEnd type="triangle" w="med" len="med"/>
+          </a:ln>
+        </p:spPr>
+        <p:style>
+          <a:lnRef idx="1">
+            <a:schemeClr val="accent1"/>
+          </a:lnRef>
+          <a:fillRef idx="0">
+            <a:schemeClr val="accent1"/>
+          </a:fillRef>
+          <a:effectRef idx="0">
+            <a:schemeClr val="accent1"/>
+          </a:effectRef>
+          <a:fontRef idx="minor">
+            <a:schemeClr val="tx1"/>
+          </a:fontRef>
+        </p:style>
+      </p:cxnSp>
+      <p:cxnSp>
+        <p:nvCxnSpPr>
+          <p:cNvPr id="69" name="直線矢印コネクタ 68">
+            <a:extLst>
+              <a:ext uri="{FF2B5EF4-FFF2-40B4-BE49-F238E27FC236}">
+                <a16:creationId xmlns:a16="http://schemas.microsoft.com/office/drawing/2014/main" id="{13DA2101-EE2A-4E20-A184-105F93835B2F}"/>
+              </a:ext>
+            </a:extLst>
+          </p:cNvPr>
+          <p:cNvCxnSpPr>
+            <a:cxnSpLocks/>
+          </p:cNvCxnSpPr>
+          <p:nvPr/>
+        </p:nvCxnSpPr>
+        <p:spPr>
+          <a:xfrm flipH="1">
+            <a:off x="7674178" y="2791461"/>
+            <a:ext cx="973618" cy="1"/>
+          </a:xfrm>
+          <a:prstGeom prst="straightConnector1">
+            <a:avLst/>
+          </a:prstGeom>
+          <a:ln w="38100">
+            <a:headEnd type="triangle" w="med" len="med"/>
+            <a:tailEnd type="triangle" w="med" len="med"/>
+          </a:ln>
+        </p:spPr>
+        <p:style>
+          <a:lnRef idx="1">
+            <a:schemeClr val="accent1"/>
+          </a:lnRef>
+          <a:fillRef idx="0">
+            <a:schemeClr val="accent1"/>
+          </a:fillRef>
+          <a:effectRef idx="0">
+            <a:schemeClr val="accent1"/>
+          </a:effectRef>
+          <a:fontRef idx="minor">
+            <a:schemeClr val="tx1"/>
+          </a:fontRef>
+        </p:style>
+      </p:cxnSp>
+      <p:sp>
+        <p:nvSpPr>
+          <p:cNvPr id="78" name="テキスト ボックス 77">
+            <a:extLst>
+              <a:ext uri="{FF2B5EF4-FFF2-40B4-BE49-F238E27FC236}">
+                <a16:creationId xmlns:a16="http://schemas.microsoft.com/office/drawing/2014/main" id="{27EA04E4-0F08-467D-8A53-FAFBD807261C}"/>
+              </a:ext>
+            </a:extLst>
+          </p:cNvPr>
+          <p:cNvSpPr txBox="1"/>
+          <p:nvPr/>
+        </p:nvSpPr>
+        <p:spPr>
+          <a:xfrm>
+            <a:off x="4880240" y="3999044"/>
+            <a:ext cx="1041952" cy="369332"/>
+          </a:xfrm>
+          <a:prstGeom prst="rect">
+            <a:avLst/>
+          </a:prstGeom>
+          <a:solidFill>
+            <a:schemeClr val="bg1"/>
+          </a:solidFill>
+        </p:spPr>
+        <p:txBody>
+          <a:bodyPr wrap="none" rtlCol="0">
+            <a:spAutoFit/>
+          </a:bodyPr>
+          <a:lstStyle/>
+          <a:p>
+            <a:r>
+              <a:rPr kumimoji="1" lang="en-US" altLang="ja-JP" dirty="0"/>
+              <a:t>Frontend</a:t>
+            </a:r>
+            <a:endParaRPr kumimoji="1" lang="ja-JP" altLang="en-US" dirty="0"/>
+          </a:p>
+        </p:txBody>
+      </p:sp>
+      <p:sp>
+        <p:nvSpPr>
+          <p:cNvPr id="81" name="テキスト ボックス 80">
+            <a:extLst>
+              <a:ext uri="{FF2B5EF4-FFF2-40B4-BE49-F238E27FC236}">
+                <a16:creationId xmlns:a16="http://schemas.microsoft.com/office/drawing/2014/main" id="{40A271E3-B5E8-41B7-9772-C9DE4F280367}"/>
+              </a:ext>
+            </a:extLst>
+          </p:cNvPr>
+          <p:cNvSpPr txBox="1"/>
+          <p:nvPr/>
+        </p:nvSpPr>
+        <p:spPr>
+          <a:xfrm>
+            <a:off x="5030680" y="178224"/>
+            <a:ext cx="973921" cy="369332"/>
+          </a:xfrm>
+          <a:prstGeom prst="rect">
+            <a:avLst/>
+          </a:prstGeom>
+          <a:solidFill>
+            <a:schemeClr val="bg1"/>
+          </a:solidFill>
+        </p:spPr>
+        <p:txBody>
+          <a:bodyPr wrap="none" rtlCol="0">
+            <a:spAutoFit/>
+          </a:bodyPr>
+          <a:lstStyle/>
+          <a:p>
+            <a:r>
+              <a:rPr kumimoji="1" lang="en-US" altLang="ja-JP" dirty="0"/>
+              <a:t>Backend</a:t>
+            </a:r>
+            <a:endParaRPr kumimoji="1" lang="ja-JP" altLang="en-US" dirty="0"/>
+          </a:p>
+        </p:txBody>
+      </p:sp>
+      <p:sp>
+        <p:nvSpPr>
+          <p:cNvPr id="3" name="TextBox 2">
+            <a:extLst>
+              <a:ext uri="{FF2B5EF4-FFF2-40B4-BE49-F238E27FC236}">
+                <a16:creationId xmlns:a16="http://schemas.microsoft.com/office/drawing/2014/main" id="{78A648DA-79C2-624D-AA63-57BA7351A567}"/>
+              </a:ext>
+            </a:extLst>
+          </p:cNvPr>
+          <p:cNvSpPr txBox="1"/>
+          <p:nvPr/>
+        </p:nvSpPr>
+        <p:spPr>
+          <a:xfrm>
+            <a:off x="418290" y="4126121"/>
+            <a:ext cx="1582228" cy="369332"/>
+          </a:xfrm>
+          <a:prstGeom prst="rect">
+            <a:avLst/>
+          </a:prstGeom>
+          <a:noFill/>
+        </p:spPr>
+        <p:txBody>
+          <a:bodyPr wrap="none" rtlCol="0">
+            <a:spAutoFit/>
+          </a:bodyPr>
+          <a:lstStyle/>
+          <a:p>
+            <a:r>
+              <a:rPr lang="en-US" dirty="0"/>
+              <a:t>User (Browser)</a:t>
+            </a:r>
+          </a:p>
+        </p:txBody>
+      </p:sp>
+      <p:sp>
+        <p:nvSpPr>
+          <p:cNvPr id="8" name="Can 7">
+            <a:extLst>
+              <a:ext uri="{FF2B5EF4-FFF2-40B4-BE49-F238E27FC236}">
+                <a16:creationId xmlns:a16="http://schemas.microsoft.com/office/drawing/2014/main" id="{6D389A55-F10C-984E-8955-FA4C4EF7DD1A}"/>
+              </a:ext>
+            </a:extLst>
+          </p:cNvPr>
+          <p:cNvSpPr/>
+          <p:nvPr/>
+        </p:nvSpPr>
+        <p:spPr>
+          <a:xfrm rot="14881054">
+            <a:off x="3492706" y="1899015"/>
+            <a:ext cx="278329" cy="1896656"/>
+          </a:xfrm>
+          <a:prstGeom prst="can">
+            <a:avLst/>
+          </a:prstGeom>
+        </p:spPr>
+        <p:style>
+          <a:lnRef idx="2">
+            <a:schemeClr val="accent1">
+              <a:shade val="50000"/>
+            </a:schemeClr>
+          </a:lnRef>
+          <a:fillRef idx="1">
+            <a:schemeClr val="accent1"/>
+          </a:fillRef>
+          <a:effectRef idx="0">
+            <a:schemeClr val="accent1"/>
+          </a:effectRef>
+          <a:fontRef idx="minor">
+            <a:schemeClr val="lt1"/>
+          </a:fontRef>
+        </p:style>
+        <p:txBody>
+          <a:bodyPr rtlCol="0" anchor="ctr"/>
+          <a:lstStyle/>
+          <a:p>
+            <a:pPr algn="ctr"/>
+            <a:endParaRPr lang="en-US"/>
+          </a:p>
+        </p:txBody>
+      </p:sp>
+      <p:sp>
+        <p:nvSpPr>
+          <p:cNvPr id="7" name="TextBox 6">
+            <a:extLst>
+              <a:ext uri="{FF2B5EF4-FFF2-40B4-BE49-F238E27FC236}">
+                <a16:creationId xmlns:a16="http://schemas.microsoft.com/office/drawing/2014/main" id="{48D8EA65-5000-D443-BCE5-866C3D75236C}"/>
+              </a:ext>
+            </a:extLst>
+          </p:cNvPr>
+          <p:cNvSpPr txBox="1"/>
+          <p:nvPr/>
+        </p:nvSpPr>
+        <p:spPr>
+          <a:xfrm rot="20323196">
+            <a:off x="2799694" y="2667198"/>
+            <a:ext cx="1636923" cy="369332"/>
+          </a:xfrm>
+          <a:prstGeom prst="rect">
+            <a:avLst/>
+          </a:prstGeom>
+          <a:noFill/>
+        </p:spPr>
+        <p:txBody>
+          <a:bodyPr wrap="none" rtlCol="0">
+            <a:spAutoFit/>
+          </a:bodyPr>
+          <a:lstStyle/>
+          <a:p>
+            <a:r>
+              <a:rPr lang="en-US" dirty="0">
+                <a:solidFill>
+                  <a:srgbClr val="FF0000"/>
+                </a:solidFill>
+              </a:rPr>
+              <a:t>HTTPS(SSL/TLS)</a:t>
+            </a:r>
+          </a:p>
+        </p:txBody>
+      </p:sp>
+      <p:sp>
+        <p:nvSpPr>
+          <p:cNvPr id="46" name="Can 45">
+            <a:extLst>
+              <a:ext uri="{FF2B5EF4-FFF2-40B4-BE49-F238E27FC236}">
+                <a16:creationId xmlns:a16="http://schemas.microsoft.com/office/drawing/2014/main" id="{C3326E1D-510B-1B4E-81B4-292DB72C72CB}"/>
+              </a:ext>
+            </a:extLst>
+          </p:cNvPr>
+          <p:cNvSpPr/>
+          <p:nvPr/>
+        </p:nvSpPr>
+        <p:spPr>
+          <a:xfrm rot="17145457">
+            <a:off x="3387875" y="3361786"/>
+            <a:ext cx="278329" cy="1896656"/>
+          </a:xfrm>
+          <a:prstGeom prst="can">
+            <a:avLst/>
+          </a:prstGeom>
+          <a:solidFill>
+            <a:srgbClr val="FFC000"/>
+          </a:solidFill>
+        </p:spPr>
+        <p:style>
+          <a:lnRef idx="2">
+            <a:schemeClr val="accent1">
+              <a:shade val="50000"/>
+            </a:schemeClr>
+          </a:lnRef>
+          <a:fillRef idx="1">
+            <a:schemeClr val="accent1"/>
+          </a:fillRef>
+          <a:effectRef idx="0">
+            <a:schemeClr val="accent1"/>
+          </a:effectRef>
+          <a:fontRef idx="minor">
+            <a:schemeClr val="lt1"/>
+          </a:fontRef>
+        </p:style>
+        <p:txBody>
+          <a:bodyPr rtlCol="0" anchor="ctr"/>
+          <a:lstStyle/>
+          <a:p>
+            <a:pPr algn="ctr"/>
+            <a:endParaRPr lang="en-US"/>
+          </a:p>
+        </p:txBody>
+      </p:sp>
+      <p:sp>
+        <p:nvSpPr>
+          <p:cNvPr id="47" name="TextBox 46">
+            <a:extLst>
+              <a:ext uri="{FF2B5EF4-FFF2-40B4-BE49-F238E27FC236}">
+                <a16:creationId xmlns:a16="http://schemas.microsoft.com/office/drawing/2014/main" id="{C4DC875C-F8AF-7247-BB11-C44C02CFB0F8}"/>
+              </a:ext>
+            </a:extLst>
+          </p:cNvPr>
+          <p:cNvSpPr txBox="1"/>
+          <p:nvPr/>
+        </p:nvSpPr>
+        <p:spPr>
+          <a:xfrm rot="987599">
+            <a:off x="2694863" y="4129969"/>
+            <a:ext cx="1636923" cy="369332"/>
+          </a:xfrm>
+          <a:prstGeom prst="rect">
+            <a:avLst/>
+          </a:prstGeom>
+          <a:noFill/>
+        </p:spPr>
+        <p:txBody>
+          <a:bodyPr wrap="none" rtlCol="0">
+            <a:spAutoFit/>
+          </a:bodyPr>
+          <a:lstStyle/>
+          <a:p>
+            <a:r>
+              <a:rPr lang="en-US" dirty="0">
+                <a:solidFill>
+                  <a:srgbClr val="FF0000"/>
+                </a:solidFill>
+              </a:rPr>
+              <a:t>HTTPS(SSL/TLS)</a:t>
+            </a:r>
+          </a:p>
+        </p:txBody>
+      </p:sp>
+      <p:pic>
+        <p:nvPicPr>
+          <p:cNvPr id="10" name="Picture 9">
+            <a:extLst>
+              <a:ext uri="{FF2B5EF4-FFF2-40B4-BE49-F238E27FC236}">
+                <a16:creationId xmlns:a16="http://schemas.microsoft.com/office/drawing/2014/main" id="{60533E61-6327-7D41-8705-4A8F7AE7B46E}"/>
+              </a:ext>
+            </a:extLst>
+          </p:cNvPr>
+          <p:cNvPicPr>
+            <a:picLocks noChangeAspect="1"/>
+          </p:cNvPicPr>
+          <p:nvPr/>
+        </p:nvPicPr>
+        <p:blipFill>
+          <a:blip r:embed="rId9"/>
+          <a:stretch>
+            <a:fillRect/>
+          </a:stretch>
+        </p:blipFill>
+        <p:spPr>
+          <a:xfrm>
+            <a:off x="2387327" y="716919"/>
+            <a:ext cx="1057298" cy="962260"/>
+          </a:xfrm>
+          <a:prstGeom prst="rect">
+            <a:avLst/>
+          </a:prstGeom>
+        </p:spPr>
+      </p:pic>
+      <p:cxnSp>
+        <p:nvCxnSpPr>
+          <p:cNvPr id="12" name="Straight Arrow Connector 11">
+            <a:extLst>
+              <a:ext uri="{FF2B5EF4-FFF2-40B4-BE49-F238E27FC236}">
+                <a16:creationId xmlns:a16="http://schemas.microsoft.com/office/drawing/2014/main" id="{055ED6DC-36A2-6043-BEBF-854814B7D022}"/>
+              </a:ext>
+            </a:extLst>
+          </p:cNvPr>
+          <p:cNvCxnSpPr>
+            <a:stCxn id="10" idx="2"/>
+          </p:cNvCxnSpPr>
+          <p:nvPr/>
+        </p:nvCxnSpPr>
+        <p:spPr>
+          <a:xfrm>
+            <a:off x="2915976" y="1679179"/>
+            <a:ext cx="446503" cy="972039"/>
+          </a:xfrm>
+          <a:prstGeom prst="straightConnector1">
+            <a:avLst/>
+          </a:prstGeom>
+          <a:ln w="38100">
+            <a:solidFill>
+              <a:schemeClr val="tx1"/>
+            </a:solidFill>
+            <a:tailEnd type="triangle"/>
+          </a:ln>
+        </p:spPr>
+        <p:style>
+          <a:lnRef idx="1">
+            <a:schemeClr val="accent1"/>
+          </a:lnRef>
+          <a:fillRef idx="0">
+            <a:schemeClr val="accent1"/>
+          </a:fillRef>
+          <a:effectRef idx="0">
+            <a:schemeClr val="accent1"/>
+          </a:effectRef>
+          <a:fontRef idx="minor">
+            <a:schemeClr val="tx1"/>
+          </a:fontRef>
+        </p:style>
+      </p:cxnSp>
+      <p:sp>
+        <p:nvSpPr>
+          <p:cNvPr id="39" name="Cross 38">
+            <a:extLst>
+              <a:ext uri="{FF2B5EF4-FFF2-40B4-BE49-F238E27FC236}">
+                <a16:creationId xmlns:a16="http://schemas.microsoft.com/office/drawing/2014/main" id="{8A19A62D-9902-0B46-AECE-BF2E4D401AE1}"/>
+              </a:ext>
+            </a:extLst>
+          </p:cNvPr>
+          <p:cNvSpPr/>
+          <p:nvPr/>
+        </p:nvSpPr>
+        <p:spPr>
+          <a:xfrm rot="17943525">
+            <a:off x="2268434" y="986123"/>
+            <a:ext cx="1396666" cy="1393816"/>
+          </a:xfrm>
+          <a:prstGeom prst="plus">
+            <a:avLst>
+              <a:gd name="adj" fmla="val 44101"/>
+            </a:avLst>
+          </a:prstGeom>
+          <a:solidFill>
+            <a:srgbClr val="FF0000"/>
+          </a:solidFill>
+        </p:spPr>
+        <p:style>
+          <a:lnRef idx="2">
+            <a:schemeClr val="accent1">
+              <a:shade val="50000"/>
+            </a:schemeClr>
+          </a:lnRef>
+          <a:fillRef idx="1">
+            <a:schemeClr val="accent1"/>
+          </a:fillRef>
+          <a:effectRef idx="0">
+            <a:schemeClr val="accent1"/>
+          </a:effectRef>
+          <a:fontRef idx="minor">
+            <a:schemeClr val="lt1"/>
+          </a:fontRef>
+        </p:style>
+        <p:txBody>
+          <a:bodyPr rtlCol="0" anchor="ctr"/>
+          <a:lstStyle/>
+          <a:p>
+            <a:pPr algn="ctr"/>
+            <a:endParaRPr lang="en-US" dirty="0"/>
+          </a:p>
+        </p:txBody>
+      </p:sp>
+      <p:sp>
+        <p:nvSpPr>
+          <p:cNvPr id="43" name="Rounded Rectangular Callout 42">
+            <a:extLst>
+              <a:ext uri="{FF2B5EF4-FFF2-40B4-BE49-F238E27FC236}">
+                <a16:creationId xmlns:a16="http://schemas.microsoft.com/office/drawing/2014/main" id="{49C0A9DF-B6E6-BA4F-B4A3-EEE46F2CEFA8}"/>
+              </a:ext>
+            </a:extLst>
+          </p:cNvPr>
+          <p:cNvSpPr/>
+          <p:nvPr/>
+        </p:nvSpPr>
+        <p:spPr>
+          <a:xfrm>
+            <a:off x="418291" y="54741"/>
+            <a:ext cx="4029542" cy="612648"/>
+          </a:xfrm>
+          <a:prstGeom prst="wedgeRoundRectCallout">
+            <a:avLst>
+              <a:gd name="adj1" fmla="val -288"/>
+              <a:gd name="adj2" fmla="val 77593"/>
+              <a:gd name="adj3" fmla="val 16667"/>
+            </a:avLst>
+          </a:prstGeom>
+          <a:noFill/>
+          <a:ln w="38100"/>
+        </p:spPr>
+        <p:style>
+          <a:lnRef idx="2">
+            <a:schemeClr val="accent1">
+              <a:shade val="50000"/>
+            </a:schemeClr>
+          </a:lnRef>
+          <a:fillRef idx="1">
+            <a:schemeClr val="accent1"/>
+          </a:fillRef>
+          <a:effectRef idx="0">
+            <a:schemeClr val="accent1"/>
+          </a:effectRef>
+          <a:fontRef idx="minor">
+            <a:schemeClr val="lt1"/>
+          </a:fontRef>
+        </p:style>
+        <p:txBody>
+          <a:bodyPr rtlCol="0" anchor="ctr"/>
+          <a:lstStyle/>
+          <a:p>
+            <a:r>
+              <a:rPr lang="en-US" dirty="0">
+                <a:solidFill>
+                  <a:schemeClr val="tx1"/>
+                </a:solidFill>
+              </a:rPr>
+              <a:t>SSL/TLS prevent protect user data from being eavesdropped on a public channel</a:t>
+            </a:r>
+          </a:p>
+        </p:txBody>
+      </p:sp>
+    </p:spTree>
+    <p:extLst>
+      <p:ext uri="{BB962C8B-B14F-4D97-AF65-F5344CB8AC3E}">
+        <p14:creationId xmlns:p14="http://schemas.microsoft.com/office/powerpoint/2010/main" val="1424230873"/>
+      </p:ext>
+    </p:extLst>
+  </p:cSld>
+  <p:clrMapOvr>
+    <a:masterClrMapping/>
+  </p:clrMapOvr>
+</p:sld>
+</file>
+
+<file path=ppt/slides/slide4.xml><?xml version="1.0" encoding="utf-8"?>
+<p:sld xmlns:a="http://schemas.openxmlformats.org/drawingml/2006/main" xmlns:r="http://schemas.openxmlformats.org/officeDocument/2006/relationships" xmlns:p="http://schemas.openxmlformats.org/presentationml/2006/main">
+  <p:cSld>
+    <p:spTree>
+      <p:nvGrpSpPr>
+        <p:cNvPr id="1" name=""/>
+        <p:cNvGrpSpPr/>
+        <p:nvPr/>
+      </p:nvGrpSpPr>
+      <p:grpSpPr>
+        <a:xfrm>
+          <a:off x="0" y="0"/>
+          <a:ext cx="0" cy="0"/>
+          <a:chOff x="0" y="0"/>
+          <a:chExt cx="0" cy="0"/>
+        </a:xfrm>
+      </p:grpSpPr>
+      <p:sp>
+        <p:nvSpPr>
+          <p:cNvPr id="5" name="Rounded Rectangle 4">
+            <a:extLst>
+              <a:ext uri="{FF2B5EF4-FFF2-40B4-BE49-F238E27FC236}">
+                <a16:creationId xmlns:a16="http://schemas.microsoft.com/office/drawing/2014/main" id="{6E531449-230A-7148-A6E5-B91A61DBBAF9}"/>
+              </a:ext>
+            </a:extLst>
+          </p:cNvPr>
+          <p:cNvSpPr/>
+          <p:nvPr/>
+        </p:nvSpPr>
+        <p:spPr>
+          <a:xfrm>
+            <a:off x="5089132" y="342900"/>
+            <a:ext cx="4784333" cy="3440995"/>
+          </a:xfrm>
+          <a:prstGeom prst="roundRect">
+            <a:avLst/>
+          </a:prstGeom>
+          <a:noFill/>
+          <a:ln w="38100">
+            <a:solidFill>
+              <a:schemeClr val="accent1"/>
+            </a:solidFill>
+          </a:ln>
+        </p:spPr>
+        <p:style>
+          <a:lnRef idx="2">
+            <a:schemeClr val="accent1">
+              <a:shade val="50000"/>
+            </a:schemeClr>
+          </a:lnRef>
+          <a:fillRef idx="1">
+            <a:schemeClr val="accent1"/>
+          </a:fillRef>
+          <a:effectRef idx="0">
+            <a:schemeClr val="accent1"/>
+          </a:effectRef>
+          <a:fontRef idx="minor">
+            <a:schemeClr val="lt1"/>
+          </a:fontRef>
+        </p:style>
+        <p:txBody>
+          <a:bodyPr rtlCol="0" anchor="ctr"/>
+          <a:lstStyle/>
+          <a:p>
+            <a:pPr algn="ctr"/>
+            <a:endParaRPr lang="en-US"/>
+          </a:p>
+        </p:txBody>
+      </p:sp>
+      <p:sp>
+        <p:nvSpPr>
+          <p:cNvPr id="6" name="TextBox 5">
+            <a:extLst>
+              <a:ext uri="{FF2B5EF4-FFF2-40B4-BE49-F238E27FC236}">
+                <a16:creationId xmlns:a16="http://schemas.microsoft.com/office/drawing/2014/main" id="{4A08E93B-DF74-5341-BB01-46A4380C760F}"/>
+              </a:ext>
+            </a:extLst>
+          </p:cNvPr>
+          <p:cNvSpPr txBox="1"/>
+          <p:nvPr/>
+        </p:nvSpPr>
+        <p:spPr>
+          <a:xfrm>
+            <a:off x="6379943" y="6351508"/>
+            <a:ext cx="2674835" cy="369332"/>
+          </a:xfrm>
+          <a:prstGeom prst="rect">
+            <a:avLst/>
+          </a:prstGeom>
+          <a:noFill/>
+        </p:spPr>
+        <p:txBody>
+          <a:bodyPr wrap="none" rtlCol="0">
+            <a:spAutoFit/>
+          </a:bodyPr>
+          <a:lstStyle/>
+          <a:p>
+            <a:pPr algn="ctr"/>
+            <a:r>
+              <a:rPr lang="en-US" altLang="ja-JP" dirty="0"/>
+              <a:t>Cloud</a:t>
+            </a:r>
+            <a:r>
+              <a:rPr lang="ja-JP" altLang="en-US" dirty="0"/>
+              <a:t> </a:t>
+            </a:r>
+            <a:r>
+              <a:rPr lang="en-US" altLang="ja-JP" dirty="0"/>
+              <a:t>platform (e.g., AWS)</a:t>
+            </a:r>
+            <a:endParaRPr lang="en-US" dirty="0"/>
+          </a:p>
+        </p:txBody>
+      </p:sp>
+      <p:pic>
+        <p:nvPicPr>
+          <p:cNvPr id="14" name="Picture 13">
+            <a:extLst>
+              <a:ext uri="{FF2B5EF4-FFF2-40B4-BE49-F238E27FC236}">
+                <a16:creationId xmlns:a16="http://schemas.microsoft.com/office/drawing/2014/main" id="{4C9C6CFB-A5CA-2B47-8998-2F59B37E6832}"/>
+              </a:ext>
+            </a:extLst>
+          </p:cNvPr>
+          <p:cNvPicPr>
+            <a:picLocks noChangeAspect="1"/>
+          </p:cNvPicPr>
+          <p:nvPr/>
+        </p:nvPicPr>
+        <p:blipFill>
+          <a:blip r:embed="rId2">
+            <a:extLst>
+              <a:ext uri="{28A0092B-C50C-407E-A947-70E740481C1C}">
+                <a14:useLocalDpi xmlns:a14="http://schemas.microsoft.com/office/drawing/2010/main" val="0"/>
+              </a:ext>
+            </a:extLst>
+          </a:blip>
+          <a:stretch>
+            <a:fillRect/>
+          </a:stretch>
+        </p:blipFill>
+        <p:spPr>
+          <a:xfrm>
+            <a:off x="5517641" y="1778001"/>
+            <a:ext cx="521366" cy="625640"/>
+          </a:xfrm>
+          <a:prstGeom prst="rect">
+            <a:avLst/>
+          </a:prstGeom>
+        </p:spPr>
+      </p:pic>
+      <p:sp>
+        <p:nvSpPr>
+          <p:cNvPr id="15" name="TextBox 14">
+            <a:extLst>
+              <a:ext uri="{FF2B5EF4-FFF2-40B4-BE49-F238E27FC236}">
+                <a16:creationId xmlns:a16="http://schemas.microsoft.com/office/drawing/2014/main" id="{90737ECB-BA51-494D-B878-65C5981552AC}"/>
+              </a:ext>
+            </a:extLst>
+          </p:cNvPr>
+          <p:cNvSpPr txBox="1"/>
+          <p:nvPr/>
+        </p:nvSpPr>
+        <p:spPr>
+          <a:xfrm>
+            <a:off x="5330948" y="2448800"/>
+            <a:ext cx="894752" cy="155632"/>
+          </a:xfrm>
+          <a:prstGeom prst="rect">
+            <a:avLst/>
+          </a:prstGeom>
+          <a:noFill/>
+        </p:spPr>
+        <p:txBody>
+          <a:bodyPr wrap="square" lIns="0" tIns="0" rIns="0" bIns="0" rtlCol="0" anchor="t">
+            <a:noAutofit/>
+          </a:bodyPr>
+          <a:lstStyle/>
+          <a:p>
+            <a:pPr algn="ctr"/>
+            <a:r>
+              <a:rPr lang="en-US" sz="1000" b="1" dirty="0"/>
+              <a:t>Amazon API Gateway*</a:t>
+            </a:r>
+            <a:endParaRPr lang="en-US" b="1" dirty="0"/>
+          </a:p>
+        </p:txBody>
+      </p:sp>
+      <p:sp>
+        <p:nvSpPr>
+          <p:cNvPr id="16" name="TextBox 15">
+            <a:extLst>
+              <a:ext uri="{FF2B5EF4-FFF2-40B4-BE49-F238E27FC236}">
+                <a16:creationId xmlns:a16="http://schemas.microsoft.com/office/drawing/2014/main" id="{F445D0C1-83C0-B94A-8C46-368940D430C1}"/>
+              </a:ext>
+            </a:extLst>
+          </p:cNvPr>
+          <p:cNvSpPr txBox="1"/>
+          <p:nvPr/>
+        </p:nvSpPr>
+        <p:spPr>
+          <a:xfrm>
+            <a:off x="8632717" y="5140188"/>
+            <a:ext cx="768159" cy="338554"/>
+          </a:xfrm>
+          <a:prstGeom prst="rect">
+            <a:avLst/>
+          </a:prstGeom>
+          <a:noFill/>
+        </p:spPr>
+        <p:txBody>
+          <a:bodyPr wrap="none" rtlCol="0">
+            <a:spAutoFit/>
+          </a:bodyPr>
+          <a:lstStyle/>
+          <a:p>
+            <a:pPr algn="ctr"/>
+            <a:r>
+              <a:rPr lang="en-US" sz="800" b="1" dirty="0">
+                <a:latin typeface="Helvetica Neue"/>
+                <a:cs typeface="Helvetica Neue"/>
+              </a:rPr>
+              <a:t>Amazon S3 </a:t>
+            </a:r>
+            <a:br>
+              <a:rPr lang="en-US" sz="800" b="1" dirty="0">
+                <a:latin typeface="Helvetica Neue"/>
+                <a:cs typeface="Helvetica Neue"/>
+              </a:rPr>
+            </a:br>
+            <a:r>
+              <a:rPr lang="en-US" sz="800" b="1" dirty="0">
+                <a:latin typeface="Helvetica Neue"/>
+                <a:cs typeface="Helvetica Neue"/>
+              </a:rPr>
+              <a:t>bucket</a:t>
+            </a:r>
+          </a:p>
+        </p:txBody>
+      </p:sp>
+      <p:pic>
+        <p:nvPicPr>
+          <p:cNvPr id="17" name="Picture 16">
+            <a:extLst>
+              <a:ext uri="{FF2B5EF4-FFF2-40B4-BE49-F238E27FC236}">
+                <a16:creationId xmlns:a16="http://schemas.microsoft.com/office/drawing/2014/main" id="{7D17C7D3-6C5D-D541-AA07-AA3F2994110A}"/>
+              </a:ext>
+            </a:extLst>
+          </p:cNvPr>
+          <p:cNvPicPr>
+            <a:picLocks noChangeAspect="1"/>
+          </p:cNvPicPr>
+          <p:nvPr/>
+        </p:nvPicPr>
+        <p:blipFill>
+          <a:blip r:embed="rId3">
+            <a:extLst>
+              <a:ext uri="{28A0092B-C50C-407E-A947-70E740481C1C}">
+                <a14:useLocalDpi xmlns:a14="http://schemas.microsoft.com/office/drawing/2010/main" val="0"/>
+              </a:ext>
+            </a:extLst>
+          </a:blip>
+          <a:stretch>
+            <a:fillRect/>
+          </a:stretch>
+        </p:blipFill>
+        <p:spPr>
+          <a:xfrm>
+            <a:off x="8762350" y="4634972"/>
+            <a:ext cx="468336" cy="485681"/>
+          </a:xfrm>
+          <a:prstGeom prst="rect">
+            <a:avLst/>
+          </a:prstGeom>
+        </p:spPr>
+      </p:pic>
+      <p:sp>
+        <p:nvSpPr>
+          <p:cNvPr id="18" name="TextBox 17">
+            <a:extLst>
+              <a:ext uri="{FF2B5EF4-FFF2-40B4-BE49-F238E27FC236}">
+                <a16:creationId xmlns:a16="http://schemas.microsoft.com/office/drawing/2014/main" id="{1AF4C9ED-AE65-F947-B5DC-5DF6F5AF23EE}"/>
+              </a:ext>
+            </a:extLst>
+          </p:cNvPr>
+          <p:cNvSpPr txBox="1"/>
+          <p:nvPr/>
+        </p:nvSpPr>
+        <p:spPr>
+          <a:xfrm>
+            <a:off x="1326570" y="3260420"/>
+            <a:ext cx="822960" cy="320040"/>
+          </a:xfrm>
+          <a:prstGeom prst="rect">
+            <a:avLst/>
+          </a:prstGeom>
+          <a:noFill/>
+        </p:spPr>
+        <p:txBody>
+          <a:bodyPr wrap="none" lIns="0" tIns="0" rIns="0" bIns="0" rtlCol="0" anchor="t">
+            <a:noAutofit/>
+          </a:bodyPr>
+          <a:lstStyle/>
+          <a:p>
+            <a:pPr algn="ctr"/>
+            <a:r>
+              <a:rPr lang="en-US" sz="1100" dirty="0">
+                <a:latin typeface="Helvetica Neue"/>
+                <a:cs typeface="Helvetica Neue"/>
+              </a:rPr>
+              <a:t>JavaScript</a:t>
+            </a:r>
+          </a:p>
+        </p:txBody>
+      </p:sp>
+      <p:pic>
+        <p:nvPicPr>
+          <p:cNvPr id="19" name="Picture 18">
+            <a:extLst>
+              <a:ext uri="{FF2B5EF4-FFF2-40B4-BE49-F238E27FC236}">
+                <a16:creationId xmlns:a16="http://schemas.microsoft.com/office/drawing/2014/main" id="{2A2D865E-3AF3-3A4A-B33F-6D4703908574}"/>
+              </a:ext>
+            </a:extLst>
+          </p:cNvPr>
+          <p:cNvPicPr>
+            <a:picLocks noChangeAspect="1"/>
+          </p:cNvPicPr>
+          <p:nvPr/>
+        </p:nvPicPr>
+        <p:blipFill>
+          <a:blip r:embed="rId4">
+            <a:extLst>
+              <a:ext uri="{28A0092B-C50C-407E-A947-70E740481C1C}">
+                <a14:useLocalDpi xmlns:a14="http://schemas.microsoft.com/office/drawing/2010/main" val="0"/>
+              </a:ext>
+            </a:extLst>
+          </a:blip>
+          <a:stretch>
+            <a:fillRect/>
+          </a:stretch>
+        </p:blipFill>
+        <p:spPr>
+          <a:xfrm>
+            <a:off x="1408191" y="2500745"/>
+            <a:ext cx="659718" cy="759675"/>
+          </a:xfrm>
+          <a:prstGeom prst="rect">
+            <a:avLst/>
+          </a:prstGeom>
+        </p:spPr>
+      </p:pic>
+      <p:pic>
+        <p:nvPicPr>
+          <p:cNvPr id="20" name="Picture 19">
+            <a:extLst>
+              <a:ext uri="{FF2B5EF4-FFF2-40B4-BE49-F238E27FC236}">
+                <a16:creationId xmlns:a16="http://schemas.microsoft.com/office/drawing/2014/main" id="{EDD31DA4-F4CC-1647-AC75-104DA91972AB}"/>
+              </a:ext>
+            </a:extLst>
+          </p:cNvPr>
+          <p:cNvPicPr>
+            <a:picLocks noChangeAspect="1"/>
+          </p:cNvPicPr>
+          <p:nvPr/>
+        </p:nvPicPr>
+        <p:blipFill>
+          <a:blip r:embed="rId5">
+            <a:extLst>
+              <a:ext uri="{28A0092B-C50C-407E-A947-70E740481C1C}">
+                <a14:useLocalDpi xmlns:a14="http://schemas.microsoft.com/office/drawing/2010/main" val="0"/>
+              </a:ext>
+            </a:extLst>
+          </a:blip>
+          <a:stretch>
+            <a:fillRect/>
+          </a:stretch>
+        </p:blipFill>
+        <p:spPr>
+          <a:xfrm>
+            <a:off x="7083627" y="2403641"/>
+            <a:ext cx="544781" cy="653737"/>
+          </a:xfrm>
+          <a:prstGeom prst="rect">
+            <a:avLst/>
+          </a:prstGeom>
+        </p:spPr>
+      </p:pic>
+      <p:sp>
+        <p:nvSpPr>
+          <p:cNvPr id="21" name="TextBox 20">
+            <a:extLst>
+              <a:ext uri="{FF2B5EF4-FFF2-40B4-BE49-F238E27FC236}">
+                <a16:creationId xmlns:a16="http://schemas.microsoft.com/office/drawing/2014/main" id="{D39F4622-C3A9-8041-BE1F-C6EF103DBA55}"/>
+              </a:ext>
+            </a:extLst>
+          </p:cNvPr>
+          <p:cNvSpPr txBox="1"/>
+          <p:nvPr/>
+        </p:nvSpPr>
+        <p:spPr>
+          <a:xfrm>
+            <a:off x="6943514" y="3084565"/>
+            <a:ext cx="825006" cy="155632"/>
+          </a:xfrm>
+          <a:prstGeom prst="rect">
+            <a:avLst/>
+          </a:prstGeom>
+          <a:noFill/>
+        </p:spPr>
+        <p:txBody>
+          <a:bodyPr wrap="square" lIns="0" tIns="0" rIns="0" bIns="0" rtlCol="0" anchor="t">
+            <a:noAutofit/>
+          </a:bodyPr>
+          <a:lstStyle/>
+          <a:p>
+            <a:pPr algn="ctr"/>
+            <a:r>
+              <a:rPr lang="en-US" sz="1000" b="1" dirty="0"/>
+              <a:t>AWS</a:t>
+            </a:r>
+          </a:p>
+          <a:p>
+            <a:pPr algn="ctr"/>
+            <a:r>
+              <a:rPr lang="en-US" sz="1000" b="1" dirty="0"/>
+              <a:t>Lambda</a:t>
+            </a:r>
+          </a:p>
+        </p:txBody>
+      </p:sp>
+      <p:pic>
+        <p:nvPicPr>
+          <p:cNvPr id="22" name="Picture 21">
+            <a:extLst>
+              <a:ext uri="{FF2B5EF4-FFF2-40B4-BE49-F238E27FC236}">
+                <a16:creationId xmlns:a16="http://schemas.microsoft.com/office/drawing/2014/main" id="{D0BD14A0-199D-1D42-A7D9-8D431C87AC85}"/>
+              </a:ext>
+            </a:extLst>
+          </p:cNvPr>
+          <p:cNvPicPr>
+            <a:picLocks noChangeAspect="1"/>
+          </p:cNvPicPr>
+          <p:nvPr/>
+        </p:nvPicPr>
+        <p:blipFill>
+          <a:blip r:embed="rId5">
+            <a:extLst>
+              <a:ext uri="{28A0092B-C50C-407E-A947-70E740481C1C}">
+                <a14:useLocalDpi xmlns:a14="http://schemas.microsoft.com/office/drawing/2010/main" val="0"/>
+              </a:ext>
+            </a:extLst>
+          </a:blip>
+          <a:stretch>
+            <a:fillRect/>
+          </a:stretch>
+        </p:blipFill>
+        <p:spPr>
+          <a:xfrm>
+            <a:off x="7083627" y="1023969"/>
+            <a:ext cx="544781" cy="653737"/>
+          </a:xfrm>
+          <a:prstGeom prst="rect">
+            <a:avLst/>
+          </a:prstGeom>
+        </p:spPr>
+      </p:pic>
+      <p:sp>
+        <p:nvSpPr>
+          <p:cNvPr id="23" name="TextBox 22">
+            <a:extLst>
+              <a:ext uri="{FF2B5EF4-FFF2-40B4-BE49-F238E27FC236}">
+                <a16:creationId xmlns:a16="http://schemas.microsoft.com/office/drawing/2014/main" id="{861917E9-52C3-BF4F-A357-2753D2889030}"/>
+              </a:ext>
+            </a:extLst>
+          </p:cNvPr>
+          <p:cNvSpPr txBox="1"/>
+          <p:nvPr/>
+        </p:nvSpPr>
+        <p:spPr>
+          <a:xfrm>
+            <a:off x="6943514" y="1704893"/>
+            <a:ext cx="825006" cy="155632"/>
+          </a:xfrm>
+          <a:prstGeom prst="rect">
+            <a:avLst/>
+          </a:prstGeom>
+          <a:noFill/>
+        </p:spPr>
+        <p:txBody>
+          <a:bodyPr wrap="square" lIns="0" tIns="0" rIns="0" bIns="0" rtlCol="0" anchor="t">
+            <a:noAutofit/>
+          </a:bodyPr>
+          <a:lstStyle/>
+          <a:p>
+            <a:pPr algn="ctr"/>
+            <a:r>
+              <a:rPr lang="en-US" sz="1000" b="1" dirty="0"/>
+              <a:t>AWS</a:t>
+            </a:r>
+          </a:p>
+          <a:p>
+            <a:pPr algn="ctr"/>
+            <a:r>
+              <a:rPr lang="en-US" sz="1000" b="1" dirty="0"/>
+              <a:t>Lambda</a:t>
+            </a:r>
+          </a:p>
+        </p:txBody>
+      </p:sp>
+      <p:sp>
+        <p:nvSpPr>
+          <p:cNvPr id="24" name="Rounded Rectangle 23">
+            <a:extLst>
+              <a:ext uri="{FF2B5EF4-FFF2-40B4-BE49-F238E27FC236}">
+                <a16:creationId xmlns:a16="http://schemas.microsoft.com/office/drawing/2014/main" id="{531291F4-3B34-2C4A-AABD-C4A14AF0B0BD}"/>
+              </a:ext>
+            </a:extLst>
+          </p:cNvPr>
+          <p:cNvSpPr/>
+          <p:nvPr/>
+        </p:nvSpPr>
+        <p:spPr>
+          <a:xfrm>
+            <a:off x="5089133" y="4176438"/>
+            <a:ext cx="4784333" cy="2091230"/>
+          </a:xfrm>
+          <a:prstGeom prst="roundRect">
+            <a:avLst/>
+          </a:prstGeom>
+          <a:noFill/>
+          <a:ln w="38100">
+            <a:solidFill>
+              <a:srgbClr val="FFC000"/>
+            </a:solidFill>
+          </a:ln>
+        </p:spPr>
+        <p:style>
+          <a:lnRef idx="2">
+            <a:schemeClr val="accent1">
+              <a:shade val="50000"/>
+            </a:schemeClr>
+          </a:lnRef>
+          <a:fillRef idx="1">
+            <a:schemeClr val="accent1"/>
+          </a:fillRef>
+          <a:effectRef idx="0">
+            <a:schemeClr val="accent1"/>
+          </a:effectRef>
+          <a:fontRef idx="minor">
+            <a:schemeClr val="lt1"/>
+          </a:fontRef>
+        </p:style>
+        <p:txBody>
+          <a:bodyPr rtlCol="0" anchor="ctr"/>
+          <a:lstStyle/>
+          <a:p>
+            <a:pPr algn="ctr"/>
+            <a:endParaRPr lang="en-US"/>
+          </a:p>
+        </p:txBody>
+      </p:sp>
+      <p:pic>
+        <p:nvPicPr>
+          <p:cNvPr id="25" name="Picture 24">
+            <a:extLst>
+              <a:ext uri="{FF2B5EF4-FFF2-40B4-BE49-F238E27FC236}">
+                <a16:creationId xmlns:a16="http://schemas.microsoft.com/office/drawing/2014/main" id="{6C3C4A50-D8A6-AD4A-A354-44625FE0AE95}"/>
+              </a:ext>
+            </a:extLst>
+          </p:cNvPr>
+          <p:cNvPicPr>
+            <a:picLocks noChangeAspect="1"/>
+          </p:cNvPicPr>
+          <p:nvPr/>
+        </p:nvPicPr>
+        <p:blipFill>
+          <a:blip r:embed="rId6">
+            <a:extLst>
+              <a:ext uri="{28A0092B-C50C-407E-A947-70E740481C1C}">
+                <a14:useLocalDpi xmlns:a14="http://schemas.microsoft.com/office/drawing/2010/main" val="0"/>
+              </a:ext>
+            </a:extLst>
+          </a:blip>
+          <a:stretch>
+            <a:fillRect/>
+          </a:stretch>
+        </p:blipFill>
+        <p:spPr>
+          <a:xfrm>
+            <a:off x="5626293" y="4566323"/>
+            <a:ext cx="544780" cy="653098"/>
+          </a:xfrm>
+          <a:prstGeom prst="rect">
+            <a:avLst/>
+          </a:prstGeom>
+        </p:spPr>
+      </p:pic>
+      <p:sp>
+        <p:nvSpPr>
+          <p:cNvPr id="26" name="TextBox 25">
+            <a:extLst>
+              <a:ext uri="{FF2B5EF4-FFF2-40B4-BE49-F238E27FC236}">
+                <a16:creationId xmlns:a16="http://schemas.microsoft.com/office/drawing/2014/main" id="{9F66391A-DB00-454C-8C1E-E2C37659FACA}"/>
+              </a:ext>
+            </a:extLst>
+          </p:cNvPr>
+          <p:cNvSpPr txBox="1"/>
+          <p:nvPr/>
+        </p:nvSpPr>
+        <p:spPr>
+          <a:xfrm>
+            <a:off x="5532923" y="5246255"/>
+            <a:ext cx="731520" cy="155632"/>
+          </a:xfrm>
+          <a:prstGeom prst="rect">
+            <a:avLst/>
+          </a:prstGeom>
+          <a:noFill/>
+        </p:spPr>
+        <p:txBody>
+          <a:bodyPr wrap="square" lIns="0" tIns="0" rIns="0" bIns="0" rtlCol="0" anchor="t">
+            <a:noAutofit/>
+          </a:bodyPr>
+          <a:lstStyle/>
+          <a:p>
+            <a:pPr algn="ctr"/>
+            <a:r>
+              <a:rPr lang="en-US" sz="1000" b="1" dirty="0"/>
+              <a:t>Amazon </a:t>
+            </a:r>
+            <a:r>
+              <a:rPr lang="en-US" sz="1000" b="1" dirty="0" err="1"/>
+              <a:t>CloudFront</a:t>
+            </a:r>
+            <a:endParaRPr lang="en-US" b="1" dirty="0"/>
+          </a:p>
+        </p:txBody>
+      </p:sp>
+      <p:pic>
+        <p:nvPicPr>
+          <p:cNvPr id="27" name="Picture 26">
+            <a:extLst>
+              <a:ext uri="{FF2B5EF4-FFF2-40B4-BE49-F238E27FC236}">
+                <a16:creationId xmlns:a16="http://schemas.microsoft.com/office/drawing/2014/main" id="{1EAD9C27-2362-DA43-96BA-B9A7DEFB7F2C}"/>
+              </a:ext>
+            </a:extLst>
+          </p:cNvPr>
+          <p:cNvPicPr>
+            <a:picLocks noChangeAspect="1"/>
+          </p:cNvPicPr>
+          <p:nvPr/>
+        </p:nvPicPr>
+        <p:blipFill>
+          <a:blip r:embed="rId7">
+            <a:extLst>
+              <a:ext uri="{28A0092B-C50C-407E-A947-70E740481C1C}">
+                <a14:useLocalDpi xmlns:a14="http://schemas.microsoft.com/office/drawing/2010/main" val="0"/>
+              </a:ext>
+            </a:extLst>
+          </a:blip>
+          <a:stretch>
+            <a:fillRect/>
+          </a:stretch>
+        </p:blipFill>
+        <p:spPr>
+          <a:xfrm>
+            <a:off x="8681766" y="1023969"/>
+            <a:ext cx="543466" cy="601994"/>
+          </a:xfrm>
+          <a:prstGeom prst="rect">
+            <a:avLst/>
+          </a:prstGeom>
+        </p:spPr>
+      </p:pic>
+      <p:sp>
+        <p:nvSpPr>
+          <p:cNvPr id="28" name="TextBox 27">
+            <a:extLst>
+              <a:ext uri="{FF2B5EF4-FFF2-40B4-BE49-F238E27FC236}">
+                <a16:creationId xmlns:a16="http://schemas.microsoft.com/office/drawing/2014/main" id="{248112C3-DC6B-3B4B-9DA8-3F113B57B059}"/>
+              </a:ext>
+            </a:extLst>
+          </p:cNvPr>
+          <p:cNvSpPr txBox="1"/>
+          <p:nvPr/>
+        </p:nvSpPr>
+        <p:spPr>
+          <a:xfrm>
+            <a:off x="8506124" y="1674372"/>
+            <a:ext cx="894752" cy="155632"/>
+          </a:xfrm>
+          <a:prstGeom prst="rect">
+            <a:avLst/>
+          </a:prstGeom>
+          <a:noFill/>
+        </p:spPr>
+        <p:txBody>
+          <a:bodyPr wrap="square" lIns="0" tIns="0" rIns="0" bIns="0" rtlCol="0" anchor="t">
+            <a:noAutofit/>
+          </a:bodyPr>
+          <a:lstStyle/>
+          <a:p>
+            <a:pPr algn="ctr"/>
+            <a:r>
+              <a:rPr lang="en-US" sz="1000" b="1" dirty="0"/>
+              <a:t>Amazon</a:t>
+            </a:r>
+            <a:br>
+              <a:rPr lang="en-US" sz="1000" b="1" dirty="0"/>
+            </a:br>
+            <a:r>
+              <a:rPr lang="en-US" sz="1000" b="1" dirty="0" err="1"/>
+              <a:t>DynamoDB</a:t>
+            </a:r>
+            <a:endParaRPr lang="en-US" b="1" dirty="0"/>
+          </a:p>
+        </p:txBody>
+      </p:sp>
+      <p:sp>
+        <p:nvSpPr>
+          <p:cNvPr id="29" name="TextBox 28">
+            <a:extLst>
+              <a:ext uri="{FF2B5EF4-FFF2-40B4-BE49-F238E27FC236}">
+                <a16:creationId xmlns:a16="http://schemas.microsoft.com/office/drawing/2014/main" id="{CA00FEFD-8243-0040-B3A2-F7D5AECB291C}"/>
+              </a:ext>
+            </a:extLst>
+          </p:cNvPr>
+          <p:cNvSpPr txBox="1"/>
+          <p:nvPr/>
+        </p:nvSpPr>
+        <p:spPr>
+          <a:xfrm>
+            <a:off x="8603917" y="3027749"/>
+            <a:ext cx="768159" cy="338554"/>
+          </a:xfrm>
+          <a:prstGeom prst="rect">
+            <a:avLst/>
+          </a:prstGeom>
+          <a:noFill/>
+        </p:spPr>
+        <p:txBody>
+          <a:bodyPr wrap="none" rtlCol="0">
+            <a:spAutoFit/>
+          </a:bodyPr>
+          <a:lstStyle/>
+          <a:p>
+            <a:pPr algn="ctr"/>
+            <a:r>
+              <a:rPr lang="en-US" sz="800" b="1" dirty="0">
+                <a:latin typeface="Helvetica Neue"/>
+                <a:cs typeface="Helvetica Neue"/>
+              </a:rPr>
+              <a:t>Amazon S3 </a:t>
+            </a:r>
+            <a:br>
+              <a:rPr lang="en-US" sz="800" b="1" dirty="0">
+                <a:latin typeface="Helvetica Neue"/>
+                <a:cs typeface="Helvetica Neue"/>
+              </a:rPr>
+            </a:br>
+            <a:r>
+              <a:rPr lang="en-US" sz="800" b="1" dirty="0">
+                <a:latin typeface="Helvetica Neue"/>
+                <a:cs typeface="Helvetica Neue"/>
+              </a:rPr>
+              <a:t>bucket</a:t>
+            </a:r>
+          </a:p>
+        </p:txBody>
+      </p:sp>
+      <p:pic>
+        <p:nvPicPr>
+          <p:cNvPr id="30" name="Picture 29">
+            <a:extLst>
+              <a:ext uri="{FF2B5EF4-FFF2-40B4-BE49-F238E27FC236}">
+                <a16:creationId xmlns:a16="http://schemas.microsoft.com/office/drawing/2014/main" id="{A2B5F8E6-C0CD-2841-83B2-287019773EED}"/>
+              </a:ext>
+            </a:extLst>
+          </p:cNvPr>
+          <p:cNvPicPr>
+            <a:picLocks noChangeAspect="1"/>
+          </p:cNvPicPr>
+          <p:nvPr/>
+        </p:nvPicPr>
+        <p:blipFill>
+          <a:blip r:embed="rId3">
+            <a:extLst>
+              <a:ext uri="{28A0092B-C50C-407E-A947-70E740481C1C}">
+                <a14:useLocalDpi xmlns:a14="http://schemas.microsoft.com/office/drawing/2010/main" val="0"/>
+              </a:ext>
+            </a:extLst>
+          </a:blip>
+          <a:stretch>
+            <a:fillRect/>
+          </a:stretch>
+        </p:blipFill>
+        <p:spPr>
+          <a:xfrm>
+            <a:off x="8733550" y="2522533"/>
+            <a:ext cx="468336" cy="485681"/>
+          </a:xfrm>
+          <a:prstGeom prst="rect">
+            <a:avLst/>
+          </a:prstGeom>
+        </p:spPr>
+      </p:pic>
+      <p:sp>
+        <p:nvSpPr>
+          <p:cNvPr id="34" name="TextBox 33">
+            <a:extLst>
+              <a:ext uri="{FF2B5EF4-FFF2-40B4-BE49-F238E27FC236}">
+                <a16:creationId xmlns:a16="http://schemas.microsoft.com/office/drawing/2014/main" id="{F4A3583D-6F24-F040-84EC-46AFBD477E43}"/>
+              </a:ext>
+            </a:extLst>
+          </p:cNvPr>
+          <p:cNvSpPr txBox="1"/>
+          <p:nvPr/>
+        </p:nvSpPr>
+        <p:spPr>
+          <a:xfrm>
+            <a:off x="5078059" y="3372035"/>
+            <a:ext cx="4784333" cy="369332"/>
+          </a:xfrm>
+          <a:prstGeom prst="rect">
+            <a:avLst/>
+          </a:prstGeom>
+          <a:noFill/>
+        </p:spPr>
+        <p:txBody>
+          <a:bodyPr wrap="square" rtlCol="0">
+            <a:spAutoFit/>
+          </a:bodyPr>
+          <a:lstStyle/>
+          <a:p>
+            <a:pPr algn="ctr"/>
+            <a:r>
+              <a:rPr lang="en-US" dirty="0"/>
+              <a:t>Computing &amp; Data resources</a:t>
+            </a:r>
+          </a:p>
+        </p:txBody>
+      </p:sp>
+      <p:sp>
+        <p:nvSpPr>
+          <p:cNvPr id="35" name="TextBox 34">
+            <a:extLst>
+              <a:ext uri="{FF2B5EF4-FFF2-40B4-BE49-F238E27FC236}">
+                <a16:creationId xmlns:a16="http://schemas.microsoft.com/office/drawing/2014/main" id="{0BBD4DDF-4571-C747-8394-0CEEA83D81DD}"/>
+              </a:ext>
+            </a:extLst>
+          </p:cNvPr>
+          <p:cNvSpPr txBox="1"/>
+          <p:nvPr/>
+        </p:nvSpPr>
+        <p:spPr>
+          <a:xfrm>
+            <a:off x="5089132" y="5608914"/>
+            <a:ext cx="4784333" cy="646331"/>
+          </a:xfrm>
+          <a:prstGeom prst="rect">
+            <a:avLst/>
+          </a:prstGeom>
+          <a:noFill/>
+        </p:spPr>
+        <p:txBody>
+          <a:bodyPr wrap="square" rtlCol="0">
+            <a:spAutoFit/>
+          </a:bodyPr>
+          <a:lstStyle/>
+          <a:p>
+            <a:pPr algn="ctr"/>
+            <a:r>
+              <a:rPr lang="en-US" dirty="0"/>
+              <a:t>Static webpage (html/</a:t>
+            </a:r>
+            <a:r>
+              <a:rPr lang="en-US" dirty="0" err="1"/>
+              <a:t>css</a:t>
+            </a:r>
+            <a:r>
+              <a:rPr lang="en-US" dirty="0"/>
+              <a:t>/</a:t>
+            </a:r>
+            <a:r>
+              <a:rPr lang="en-US" dirty="0" err="1"/>
+              <a:t>javascrip</a:t>
+            </a:r>
+            <a:r>
+              <a:rPr lang="en-US" dirty="0"/>
+              <a:t>)</a:t>
+            </a:r>
+          </a:p>
+          <a:p>
+            <a:pPr algn="ctr"/>
+            <a:r>
+              <a:rPr lang="en-US" dirty="0"/>
+              <a:t> as downloadable program</a:t>
+            </a:r>
+          </a:p>
+        </p:txBody>
+      </p:sp>
+      <p:sp>
+        <p:nvSpPr>
+          <p:cNvPr id="2" name="テキスト ボックス 1">
+            <a:extLst>
+              <a:ext uri="{FF2B5EF4-FFF2-40B4-BE49-F238E27FC236}">
+                <a16:creationId xmlns:a16="http://schemas.microsoft.com/office/drawing/2014/main" id="{727334F1-3609-4512-A307-4472AC0318BD}"/>
+              </a:ext>
+            </a:extLst>
+          </p:cNvPr>
+          <p:cNvSpPr txBox="1"/>
+          <p:nvPr/>
+        </p:nvSpPr>
+        <p:spPr>
+          <a:xfrm>
+            <a:off x="5171278" y="1468078"/>
+            <a:ext cx="1333378" cy="369332"/>
+          </a:xfrm>
+          <a:prstGeom prst="rect">
+            <a:avLst/>
+          </a:prstGeom>
+          <a:noFill/>
+        </p:spPr>
+        <p:txBody>
+          <a:bodyPr wrap="none" rtlCol="0">
+            <a:spAutoFit/>
+          </a:bodyPr>
+          <a:lstStyle/>
+          <a:p>
+            <a:r>
+              <a:rPr kumimoji="1" lang="en-US" altLang="ja-JP" dirty="0"/>
+              <a:t>RESTful APIs</a:t>
+            </a:r>
+            <a:endParaRPr kumimoji="1" lang="ja-JP" altLang="en-US" dirty="0"/>
+          </a:p>
+        </p:txBody>
+      </p:sp>
+      <p:sp>
+        <p:nvSpPr>
+          <p:cNvPr id="31" name="テキスト ボックス 30">
+            <a:extLst>
+              <a:ext uri="{FF2B5EF4-FFF2-40B4-BE49-F238E27FC236}">
+                <a16:creationId xmlns:a16="http://schemas.microsoft.com/office/drawing/2014/main" id="{86353896-446E-421E-AEA0-EF4514990CF4}"/>
+              </a:ext>
+            </a:extLst>
+          </p:cNvPr>
+          <p:cNvSpPr txBox="1"/>
+          <p:nvPr/>
+        </p:nvSpPr>
+        <p:spPr>
+          <a:xfrm>
+            <a:off x="5618247" y="4275463"/>
+            <a:ext cx="599844" cy="369332"/>
+          </a:xfrm>
+          <a:prstGeom prst="rect">
+            <a:avLst/>
+          </a:prstGeom>
+          <a:noFill/>
+        </p:spPr>
+        <p:txBody>
+          <a:bodyPr wrap="none" rtlCol="0">
+            <a:spAutoFit/>
+          </a:bodyPr>
+          <a:lstStyle/>
+          <a:p>
+            <a:r>
+              <a:rPr kumimoji="1" lang="en-US" altLang="ja-JP" dirty="0"/>
+              <a:t>CDN</a:t>
+            </a:r>
+            <a:endParaRPr kumimoji="1" lang="ja-JP" altLang="en-US" dirty="0"/>
+          </a:p>
+        </p:txBody>
+      </p:sp>
+      <p:cxnSp>
+        <p:nvCxnSpPr>
+          <p:cNvPr id="4" name="直線矢印コネクタ 3">
+            <a:extLst>
+              <a:ext uri="{FF2B5EF4-FFF2-40B4-BE49-F238E27FC236}">
+                <a16:creationId xmlns:a16="http://schemas.microsoft.com/office/drawing/2014/main" id="{537AD1F6-3C92-4886-BED4-61D71C6D19D4}"/>
+              </a:ext>
+            </a:extLst>
+          </p:cNvPr>
+          <p:cNvCxnSpPr>
+            <a:cxnSpLocks/>
+            <a:stCxn id="25" idx="1"/>
+            <a:endCxn id="13" idx="3"/>
+          </p:cNvCxnSpPr>
+          <p:nvPr/>
+        </p:nvCxnSpPr>
+        <p:spPr>
+          <a:xfrm flipH="1" flipV="1">
+            <a:off x="1774653" y="3806355"/>
+            <a:ext cx="3851640" cy="1086517"/>
+          </a:xfrm>
+          <a:prstGeom prst="straightConnector1">
+            <a:avLst/>
+          </a:prstGeom>
+          <a:ln w="38100">
+            <a:solidFill>
+              <a:srgbClr val="FFC000"/>
+            </a:solidFill>
+            <a:tailEnd type="triangle"/>
+          </a:ln>
+        </p:spPr>
+        <p:style>
+          <a:lnRef idx="1">
+            <a:schemeClr val="accent1"/>
+          </a:lnRef>
+          <a:fillRef idx="0">
+            <a:schemeClr val="accent1"/>
+          </a:fillRef>
+          <a:effectRef idx="0">
+            <a:schemeClr val="accent1"/>
+          </a:effectRef>
+          <a:fontRef idx="minor">
+            <a:schemeClr val="tx1"/>
+          </a:fontRef>
+        </p:style>
+      </p:cxnSp>
+      <p:cxnSp>
+        <p:nvCxnSpPr>
+          <p:cNvPr id="32" name="直線矢印コネクタ 31">
+            <a:extLst>
+              <a:ext uri="{FF2B5EF4-FFF2-40B4-BE49-F238E27FC236}">
+                <a16:creationId xmlns:a16="http://schemas.microsoft.com/office/drawing/2014/main" id="{0EF9CDA6-1C3C-4B7F-8C6E-2B0DD079E74C}"/>
+              </a:ext>
+            </a:extLst>
+          </p:cNvPr>
+          <p:cNvCxnSpPr>
+            <a:cxnSpLocks/>
+            <a:stCxn id="17" idx="1"/>
+            <a:endCxn id="25" idx="3"/>
+          </p:cNvCxnSpPr>
+          <p:nvPr/>
+        </p:nvCxnSpPr>
+        <p:spPr>
+          <a:xfrm flipH="1">
+            <a:off x="6171073" y="4877813"/>
+            <a:ext cx="2591277" cy="15059"/>
+          </a:xfrm>
+          <a:prstGeom prst="straightConnector1">
+            <a:avLst/>
+          </a:prstGeom>
+          <a:ln w="38100">
+            <a:solidFill>
+              <a:srgbClr val="FFC000"/>
+            </a:solidFill>
+            <a:tailEnd type="triangle"/>
+          </a:ln>
+        </p:spPr>
+        <p:style>
+          <a:lnRef idx="1">
+            <a:schemeClr val="accent1"/>
+          </a:lnRef>
+          <a:fillRef idx="0">
+            <a:schemeClr val="accent1"/>
+          </a:fillRef>
+          <a:effectRef idx="0">
+            <a:schemeClr val="accent1"/>
+          </a:effectRef>
+          <a:fontRef idx="minor">
+            <a:schemeClr val="tx1"/>
+          </a:fontRef>
+        </p:style>
+      </p:cxnSp>
+      <p:pic>
+        <p:nvPicPr>
+          <p:cNvPr id="13" name="図 12">
+            <a:extLst>
+              <a:ext uri="{FF2B5EF4-FFF2-40B4-BE49-F238E27FC236}">
+                <a16:creationId xmlns:a16="http://schemas.microsoft.com/office/drawing/2014/main" id="{9A12ED07-FB85-4F72-987E-AE9C178D6BF0}"/>
+              </a:ext>
+            </a:extLst>
+          </p:cNvPr>
+          <p:cNvPicPr>
+            <a:picLocks noChangeAspect="1"/>
+          </p:cNvPicPr>
+          <p:nvPr/>
+        </p:nvPicPr>
+        <p:blipFill>
+          <a:blip r:embed="rId8"/>
+          <a:stretch>
+            <a:fillRect/>
+          </a:stretch>
+        </p:blipFill>
+        <p:spPr>
+          <a:xfrm>
+            <a:off x="644154" y="3429000"/>
+            <a:ext cx="1130499" cy="754710"/>
+          </a:xfrm>
+          <a:prstGeom prst="rect">
+            <a:avLst/>
+          </a:prstGeom>
+        </p:spPr>
+      </p:pic>
+      <p:cxnSp>
+        <p:nvCxnSpPr>
+          <p:cNvPr id="37" name="直線矢印コネクタ 36">
+            <a:extLst>
+              <a:ext uri="{FF2B5EF4-FFF2-40B4-BE49-F238E27FC236}">
+                <a16:creationId xmlns:a16="http://schemas.microsoft.com/office/drawing/2014/main" id="{6F0D0DE8-0BFE-4880-86DD-DB262B89D35B}"/>
+              </a:ext>
+            </a:extLst>
+          </p:cNvPr>
+          <p:cNvCxnSpPr>
+            <a:cxnSpLocks/>
+            <a:endCxn id="14" idx="1"/>
+          </p:cNvCxnSpPr>
+          <p:nvPr/>
+        </p:nvCxnSpPr>
+        <p:spPr>
+          <a:xfrm flipV="1">
+            <a:off x="1823804" y="2090821"/>
+            <a:ext cx="3693837" cy="1481937"/>
+          </a:xfrm>
+          <a:prstGeom prst="straightConnector1">
+            <a:avLst/>
+          </a:prstGeom>
+          <a:ln w="38100">
+            <a:headEnd type="triangle" w="med" len="med"/>
+            <a:tailEnd type="triangle" w="med" len="med"/>
+          </a:ln>
+        </p:spPr>
+        <p:style>
+          <a:lnRef idx="1">
+            <a:schemeClr val="accent1"/>
+          </a:lnRef>
+          <a:fillRef idx="0">
+            <a:schemeClr val="accent1"/>
+          </a:fillRef>
+          <a:effectRef idx="0">
+            <a:schemeClr val="accent1"/>
+          </a:effectRef>
+          <a:fontRef idx="minor">
+            <a:schemeClr val="tx1"/>
+          </a:fontRef>
+        </p:style>
+      </p:cxnSp>
+      <p:sp>
+        <p:nvSpPr>
+          <p:cNvPr id="40" name="テキスト ボックス 39">
+            <a:extLst>
+              <a:ext uri="{FF2B5EF4-FFF2-40B4-BE49-F238E27FC236}">
+                <a16:creationId xmlns:a16="http://schemas.microsoft.com/office/drawing/2014/main" id="{4E384F71-7760-4FC1-A345-1759ECA46887}"/>
+              </a:ext>
+            </a:extLst>
+          </p:cNvPr>
+          <p:cNvSpPr txBox="1"/>
+          <p:nvPr/>
+        </p:nvSpPr>
+        <p:spPr>
+          <a:xfrm>
+            <a:off x="6766137" y="391945"/>
+            <a:ext cx="1218603" cy="646331"/>
+          </a:xfrm>
+          <a:prstGeom prst="rect">
+            <a:avLst/>
+          </a:prstGeom>
+          <a:noFill/>
+        </p:spPr>
+        <p:txBody>
+          <a:bodyPr wrap="none" rtlCol="0">
+            <a:spAutoFit/>
+          </a:bodyPr>
+          <a:lstStyle/>
+          <a:p>
+            <a:pPr algn="ctr"/>
+            <a:r>
+              <a:rPr kumimoji="1" lang="en-US" altLang="ja-JP" dirty="0"/>
+              <a:t>Computing</a:t>
+            </a:r>
+          </a:p>
+          <a:p>
+            <a:pPr algn="ctr"/>
+            <a:r>
+              <a:rPr kumimoji="1" lang="en-US" altLang="ja-JP" dirty="0"/>
+              <a:t>Functions</a:t>
+            </a:r>
+            <a:endParaRPr kumimoji="1" lang="ja-JP" altLang="en-US" dirty="0"/>
+          </a:p>
+        </p:txBody>
+      </p:sp>
+      <p:sp>
+        <p:nvSpPr>
+          <p:cNvPr id="41" name="テキスト ボックス 40">
+            <a:extLst>
+              <a:ext uri="{FF2B5EF4-FFF2-40B4-BE49-F238E27FC236}">
+                <a16:creationId xmlns:a16="http://schemas.microsoft.com/office/drawing/2014/main" id="{4FF9138F-6997-4E8E-9D48-F61143AB07AB}"/>
+              </a:ext>
+            </a:extLst>
+          </p:cNvPr>
+          <p:cNvSpPr txBox="1"/>
+          <p:nvPr/>
+        </p:nvSpPr>
+        <p:spPr>
+          <a:xfrm>
+            <a:off x="8400610" y="351204"/>
+            <a:ext cx="1134221" cy="646331"/>
+          </a:xfrm>
+          <a:prstGeom prst="rect">
+            <a:avLst/>
+          </a:prstGeom>
+          <a:noFill/>
+        </p:spPr>
+        <p:txBody>
+          <a:bodyPr wrap="none" rtlCol="0">
+            <a:spAutoFit/>
+          </a:bodyPr>
+          <a:lstStyle/>
+          <a:p>
+            <a:pPr algn="ctr"/>
+            <a:r>
+              <a:rPr kumimoji="1" lang="en-US" altLang="ja-JP" dirty="0"/>
+              <a:t>Data</a:t>
+            </a:r>
+            <a:br>
+              <a:rPr kumimoji="1" lang="en-US" altLang="ja-JP" dirty="0"/>
+            </a:br>
+            <a:r>
+              <a:rPr kumimoji="1" lang="en-US" altLang="ja-JP" dirty="0"/>
+              <a:t>Resources</a:t>
+            </a:r>
+            <a:endParaRPr kumimoji="1" lang="ja-JP" altLang="en-US" dirty="0"/>
+          </a:p>
+        </p:txBody>
+      </p:sp>
+      <p:cxnSp>
+        <p:nvCxnSpPr>
+          <p:cNvPr id="42" name="直線矢印コネクタ 41">
+            <a:extLst>
+              <a:ext uri="{FF2B5EF4-FFF2-40B4-BE49-F238E27FC236}">
+                <a16:creationId xmlns:a16="http://schemas.microsoft.com/office/drawing/2014/main" id="{83FE3D88-58AE-46A0-9004-D88BE4C03678}"/>
+              </a:ext>
+            </a:extLst>
+          </p:cNvPr>
+          <p:cNvCxnSpPr>
+            <a:cxnSpLocks/>
+            <a:stCxn id="14" idx="3"/>
+            <a:endCxn id="22" idx="1"/>
+          </p:cNvCxnSpPr>
+          <p:nvPr/>
+        </p:nvCxnSpPr>
+        <p:spPr>
+          <a:xfrm flipV="1">
+            <a:off x="6039007" y="1350838"/>
+            <a:ext cx="1044620" cy="739983"/>
+          </a:xfrm>
+          <a:prstGeom prst="straightConnector1">
+            <a:avLst/>
+          </a:prstGeom>
+          <a:ln w="38100">
+            <a:headEnd type="triangle" w="med" len="med"/>
+            <a:tailEnd type="triangle" w="med" len="med"/>
+          </a:ln>
+        </p:spPr>
+        <p:style>
+          <a:lnRef idx="1">
+            <a:schemeClr val="accent1"/>
+          </a:lnRef>
+          <a:fillRef idx="0">
+            <a:schemeClr val="accent1"/>
+          </a:fillRef>
+          <a:effectRef idx="0">
+            <a:schemeClr val="accent1"/>
+          </a:effectRef>
+          <a:fontRef idx="minor">
+            <a:schemeClr val="tx1"/>
+          </a:fontRef>
+        </p:style>
+      </p:cxnSp>
+      <p:cxnSp>
+        <p:nvCxnSpPr>
+          <p:cNvPr id="45" name="直線矢印コネクタ 44">
+            <a:extLst>
+              <a:ext uri="{FF2B5EF4-FFF2-40B4-BE49-F238E27FC236}">
+                <a16:creationId xmlns:a16="http://schemas.microsoft.com/office/drawing/2014/main" id="{66B3B0F4-119C-468D-9005-236BAA551BE5}"/>
+              </a:ext>
+            </a:extLst>
+          </p:cNvPr>
+          <p:cNvCxnSpPr>
+            <a:cxnSpLocks/>
+            <a:stCxn id="14" idx="3"/>
+            <a:endCxn id="20" idx="1"/>
+          </p:cNvCxnSpPr>
+          <p:nvPr/>
+        </p:nvCxnSpPr>
+        <p:spPr>
+          <a:xfrm>
+            <a:off x="6039007" y="2090821"/>
+            <a:ext cx="1044620" cy="639689"/>
+          </a:xfrm>
+          <a:prstGeom prst="straightConnector1">
+            <a:avLst/>
+          </a:prstGeom>
+          <a:ln w="38100">
+            <a:headEnd type="triangle" w="med" len="med"/>
+            <a:tailEnd type="triangle" w="med" len="med"/>
+          </a:ln>
+        </p:spPr>
+        <p:style>
+          <a:lnRef idx="1">
+            <a:schemeClr val="accent1"/>
+          </a:lnRef>
+          <a:fillRef idx="0">
+            <a:schemeClr val="accent1"/>
+          </a:fillRef>
+          <a:effectRef idx="0">
+            <a:schemeClr val="accent1"/>
+          </a:effectRef>
+          <a:fontRef idx="minor">
+            <a:schemeClr val="tx1"/>
+          </a:fontRef>
+        </p:style>
+      </p:cxnSp>
+      <p:cxnSp>
+        <p:nvCxnSpPr>
+          <p:cNvPr id="52" name="直線矢印コネクタ 51">
+            <a:extLst>
+              <a:ext uri="{FF2B5EF4-FFF2-40B4-BE49-F238E27FC236}">
+                <a16:creationId xmlns:a16="http://schemas.microsoft.com/office/drawing/2014/main" id="{CFC2C1FB-7A06-4253-97A5-04BC941673FF}"/>
+              </a:ext>
+            </a:extLst>
+          </p:cNvPr>
+          <p:cNvCxnSpPr>
+            <a:cxnSpLocks/>
+          </p:cNvCxnSpPr>
+          <p:nvPr/>
+        </p:nvCxnSpPr>
+        <p:spPr>
+          <a:xfrm>
+            <a:off x="7706256" y="1350838"/>
+            <a:ext cx="941540" cy="1300380"/>
+          </a:xfrm>
+          <a:prstGeom prst="straightConnector1">
+            <a:avLst/>
+          </a:prstGeom>
+          <a:ln w="38100">
+            <a:headEnd type="triangle" w="med" len="med"/>
+            <a:tailEnd type="triangle" w="med" len="med"/>
+          </a:ln>
+        </p:spPr>
+        <p:style>
+          <a:lnRef idx="1">
+            <a:schemeClr val="accent1"/>
+          </a:lnRef>
+          <a:fillRef idx="0">
+            <a:schemeClr val="accent1"/>
+          </a:fillRef>
+          <a:effectRef idx="0">
+            <a:schemeClr val="accent1"/>
+          </a:effectRef>
+          <a:fontRef idx="minor">
+            <a:schemeClr val="tx1"/>
+          </a:fontRef>
+        </p:style>
+      </p:cxnSp>
+      <p:cxnSp>
+        <p:nvCxnSpPr>
+          <p:cNvPr id="55" name="直線矢印コネクタ 54">
+            <a:extLst>
+              <a:ext uri="{FF2B5EF4-FFF2-40B4-BE49-F238E27FC236}">
+                <a16:creationId xmlns:a16="http://schemas.microsoft.com/office/drawing/2014/main" id="{2CBAC8D1-83D9-4A7D-905D-8ABEBEEDCBD8}"/>
+              </a:ext>
+            </a:extLst>
+          </p:cNvPr>
+          <p:cNvCxnSpPr>
+            <a:cxnSpLocks/>
+          </p:cNvCxnSpPr>
+          <p:nvPr/>
+        </p:nvCxnSpPr>
+        <p:spPr>
+          <a:xfrm flipH="1">
+            <a:off x="7710611" y="1379258"/>
+            <a:ext cx="893307" cy="1225174"/>
+          </a:xfrm>
+          <a:prstGeom prst="straightConnector1">
+            <a:avLst/>
+          </a:prstGeom>
+          <a:ln w="38100">
+            <a:headEnd type="triangle" w="med" len="med"/>
+            <a:tailEnd type="triangle" w="med" len="med"/>
+          </a:ln>
+        </p:spPr>
+        <p:style>
+          <a:lnRef idx="1">
+            <a:schemeClr val="accent1"/>
+          </a:lnRef>
+          <a:fillRef idx="0">
+            <a:schemeClr val="accent1"/>
+          </a:fillRef>
+          <a:effectRef idx="0">
+            <a:schemeClr val="accent1"/>
+          </a:effectRef>
+          <a:fontRef idx="minor">
+            <a:schemeClr val="tx1"/>
+          </a:fontRef>
+        </p:style>
+      </p:cxnSp>
+      <p:cxnSp>
+        <p:nvCxnSpPr>
+          <p:cNvPr id="58" name="直線矢印コネクタ 57">
+            <a:extLst>
+              <a:ext uri="{FF2B5EF4-FFF2-40B4-BE49-F238E27FC236}">
+                <a16:creationId xmlns:a16="http://schemas.microsoft.com/office/drawing/2014/main" id="{5B4584A1-7FAE-4069-8E67-A90889FC979C}"/>
+              </a:ext>
+            </a:extLst>
+          </p:cNvPr>
+          <p:cNvCxnSpPr>
+            <a:cxnSpLocks/>
+          </p:cNvCxnSpPr>
+          <p:nvPr/>
+        </p:nvCxnSpPr>
+        <p:spPr>
+          <a:xfrm flipH="1">
+            <a:off x="7650609" y="1296629"/>
+            <a:ext cx="973618" cy="1"/>
+          </a:xfrm>
+          <a:prstGeom prst="straightConnector1">
+            <a:avLst/>
+          </a:prstGeom>
+          <a:ln w="38100">
+            <a:headEnd type="triangle" w="med" len="med"/>
+            <a:tailEnd type="triangle" w="med" len="med"/>
+          </a:ln>
+        </p:spPr>
+        <p:style>
+          <a:lnRef idx="1">
+            <a:schemeClr val="accent1"/>
+          </a:lnRef>
+          <a:fillRef idx="0">
+            <a:schemeClr val="accent1"/>
+          </a:fillRef>
+          <a:effectRef idx="0">
+            <a:schemeClr val="accent1"/>
+          </a:effectRef>
+          <a:fontRef idx="minor">
+            <a:schemeClr val="tx1"/>
+          </a:fontRef>
+        </p:style>
+      </p:cxnSp>
+      <p:cxnSp>
+        <p:nvCxnSpPr>
+          <p:cNvPr id="69" name="直線矢印コネクタ 68">
+            <a:extLst>
+              <a:ext uri="{FF2B5EF4-FFF2-40B4-BE49-F238E27FC236}">
+                <a16:creationId xmlns:a16="http://schemas.microsoft.com/office/drawing/2014/main" id="{13DA2101-EE2A-4E20-A184-105F93835B2F}"/>
+              </a:ext>
+            </a:extLst>
+          </p:cNvPr>
+          <p:cNvCxnSpPr>
+            <a:cxnSpLocks/>
+          </p:cNvCxnSpPr>
+          <p:nvPr/>
+        </p:nvCxnSpPr>
+        <p:spPr>
+          <a:xfrm flipH="1">
+            <a:off x="7674178" y="2791461"/>
+            <a:ext cx="973618" cy="1"/>
+          </a:xfrm>
+          <a:prstGeom prst="straightConnector1">
+            <a:avLst/>
+          </a:prstGeom>
+          <a:ln w="38100">
+            <a:headEnd type="triangle" w="med" len="med"/>
+            <a:tailEnd type="triangle" w="med" len="med"/>
+          </a:ln>
+        </p:spPr>
+        <p:style>
+          <a:lnRef idx="1">
+            <a:schemeClr val="accent1"/>
+          </a:lnRef>
+          <a:fillRef idx="0">
+            <a:schemeClr val="accent1"/>
+          </a:fillRef>
+          <a:effectRef idx="0">
+            <a:schemeClr val="accent1"/>
+          </a:effectRef>
+          <a:fontRef idx="minor">
+            <a:schemeClr val="tx1"/>
+          </a:fontRef>
+        </p:style>
+      </p:cxnSp>
+      <p:sp>
+        <p:nvSpPr>
+          <p:cNvPr id="78" name="テキスト ボックス 77">
+            <a:extLst>
+              <a:ext uri="{FF2B5EF4-FFF2-40B4-BE49-F238E27FC236}">
+                <a16:creationId xmlns:a16="http://schemas.microsoft.com/office/drawing/2014/main" id="{27EA04E4-0F08-467D-8A53-FAFBD807261C}"/>
+              </a:ext>
+            </a:extLst>
+          </p:cNvPr>
+          <p:cNvSpPr txBox="1"/>
+          <p:nvPr/>
+        </p:nvSpPr>
+        <p:spPr>
+          <a:xfrm>
+            <a:off x="4880240" y="3999044"/>
+            <a:ext cx="1041952" cy="369332"/>
+          </a:xfrm>
+          <a:prstGeom prst="rect">
+            <a:avLst/>
+          </a:prstGeom>
+          <a:solidFill>
+            <a:schemeClr val="bg1"/>
+          </a:solidFill>
+        </p:spPr>
+        <p:txBody>
+          <a:bodyPr wrap="none" rtlCol="0">
+            <a:spAutoFit/>
+          </a:bodyPr>
+          <a:lstStyle/>
+          <a:p>
+            <a:r>
+              <a:rPr kumimoji="1" lang="en-US" altLang="ja-JP" dirty="0"/>
+              <a:t>Frontend</a:t>
+            </a:r>
+            <a:endParaRPr kumimoji="1" lang="ja-JP" altLang="en-US" dirty="0"/>
+          </a:p>
+        </p:txBody>
+      </p:sp>
+      <p:sp>
+        <p:nvSpPr>
+          <p:cNvPr id="81" name="テキスト ボックス 80">
+            <a:extLst>
+              <a:ext uri="{FF2B5EF4-FFF2-40B4-BE49-F238E27FC236}">
+                <a16:creationId xmlns:a16="http://schemas.microsoft.com/office/drawing/2014/main" id="{40A271E3-B5E8-41B7-9772-C9DE4F280367}"/>
+              </a:ext>
+            </a:extLst>
+          </p:cNvPr>
+          <p:cNvSpPr txBox="1"/>
+          <p:nvPr/>
+        </p:nvSpPr>
+        <p:spPr>
+          <a:xfrm>
+            <a:off x="5030680" y="178224"/>
+            <a:ext cx="973921" cy="369332"/>
+          </a:xfrm>
+          <a:prstGeom prst="rect">
+            <a:avLst/>
+          </a:prstGeom>
+          <a:solidFill>
+            <a:schemeClr val="bg1"/>
+          </a:solidFill>
+        </p:spPr>
+        <p:txBody>
+          <a:bodyPr wrap="none" rtlCol="0">
+            <a:spAutoFit/>
+          </a:bodyPr>
+          <a:lstStyle/>
+          <a:p>
+            <a:r>
+              <a:rPr kumimoji="1" lang="en-US" altLang="ja-JP" dirty="0"/>
+              <a:t>Backend</a:t>
+            </a:r>
+            <a:endParaRPr kumimoji="1" lang="ja-JP" altLang="en-US" dirty="0"/>
+          </a:p>
+        </p:txBody>
+      </p:sp>
+      <p:sp>
+        <p:nvSpPr>
+          <p:cNvPr id="3" name="TextBox 2">
+            <a:extLst>
+              <a:ext uri="{FF2B5EF4-FFF2-40B4-BE49-F238E27FC236}">
+                <a16:creationId xmlns:a16="http://schemas.microsoft.com/office/drawing/2014/main" id="{78A648DA-79C2-624D-AA63-57BA7351A567}"/>
+              </a:ext>
+            </a:extLst>
+          </p:cNvPr>
+          <p:cNvSpPr txBox="1"/>
+          <p:nvPr/>
+        </p:nvSpPr>
+        <p:spPr>
+          <a:xfrm>
+            <a:off x="418290" y="4126121"/>
+            <a:ext cx="1582228" cy="369332"/>
+          </a:xfrm>
+          <a:prstGeom prst="rect">
+            <a:avLst/>
+          </a:prstGeom>
+          <a:noFill/>
+        </p:spPr>
+        <p:txBody>
+          <a:bodyPr wrap="none" rtlCol="0">
+            <a:spAutoFit/>
+          </a:bodyPr>
+          <a:lstStyle/>
+          <a:p>
+            <a:r>
+              <a:rPr lang="en-US" dirty="0"/>
+              <a:t>User (Browser)</a:t>
+            </a:r>
+          </a:p>
+        </p:txBody>
+      </p:sp>
+      <p:sp>
+        <p:nvSpPr>
+          <p:cNvPr id="8" name="Can 7">
+            <a:extLst>
+              <a:ext uri="{FF2B5EF4-FFF2-40B4-BE49-F238E27FC236}">
+                <a16:creationId xmlns:a16="http://schemas.microsoft.com/office/drawing/2014/main" id="{6D389A55-F10C-984E-8955-FA4C4EF7DD1A}"/>
+              </a:ext>
+            </a:extLst>
+          </p:cNvPr>
+          <p:cNvSpPr/>
+          <p:nvPr/>
+        </p:nvSpPr>
+        <p:spPr>
+          <a:xfrm rot="14881054">
+            <a:off x="3492706" y="1899015"/>
+            <a:ext cx="278329" cy="1896656"/>
+          </a:xfrm>
+          <a:prstGeom prst="can">
+            <a:avLst/>
+          </a:prstGeom>
+        </p:spPr>
+        <p:style>
+          <a:lnRef idx="2">
+            <a:schemeClr val="accent1">
+              <a:shade val="50000"/>
+            </a:schemeClr>
+          </a:lnRef>
+          <a:fillRef idx="1">
+            <a:schemeClr val="accent1"/>
+          </a:fillRef>
+          <a:effectRef idx="0">
+            <a:schemeClr val="accent1"/>
+          </a:effectRef>
+          <a:fontRef idx="minor">
+            <a:schemeClr val="lt1"/>
+          </a:fontRef>
+        </p:style>
+        <p:txBody>
+          <a:bodyPr rtlCol="0" anchor="ctr"/>
+          <a:lstStyle/>
+          <a:p>
+            <a:pPr algn="ctr"/>
+            <a:endParaRPr lang="en-US"/>
+          </a:p>
+        </p:txBody>
+      </p:sp>
+      <p:sp>
+        <p:nvSpPr>
+          <p:cNvPr id="7" name="TextBox 6">
+            <a:extLst>
+              <a:ext uri="{FF2B5EF4-FFF2-40B4-BE49-F238E27FC236}">
+                <a16:creationId xmlns:a16="http://schemas.microsoft.com/office/drawing/2014/main" id="{48D8EA65-5000-D443-BCE5-866C3D75236C}"/>
+              </a:ext>
+            </a:extLst>
+          </p:cNvPr>
+          <p:cNvSpPr txBox="1"/>
+          <p:nvPr/>
+        </p:nvSpPr>
+        <p:spPr>
+          <a:xfrm rot="20323196">
+            <a:off x="2799694" y="2667198"/>
+            <a:ext cx="1636923" cy="369332"/>
+          </a:xfrm>
+          <a:prstGeom prst="rect">
+            <a:avLst/>
+          </a:prstGeom>
+          <a:noFill/>
+        </p:spPr>
+        <p:txBody>
+          <a:bodyPr wrap="none" rtlCol="0">
+            <a:spAutoFit/>
+          </a:bodyPr>
+          <a:lstStyle/>
+          <a:p>
+            <a:r>
+              <a:rPr lang="en-US" dirty="0">
+                <a:solidFill>
+                  <a:srgbClr val="FF0000"/>
+                </a:solidFill>
+              </a:rPr>
+              <a:t>HTTPS(SSL/TLS)</a:t>
+            </a:r>
+          </a:p>
+        </p:txBody>
+      </p:sp>
+      <p:sp>
+        <p:nvSpPr>
+          <p:cNvPr id="46" name="Can 45">
+            <a:extLst>
+              <a:ext uri="{FF2B5EF4-FFF2-40B4-BE49-F238E27FC236}">
+                <a16:creationId xmlns:a16="http://schemas.microsoft.com/office/drawing/2014/main" id="{C3326E1D-510B-1B4E-81B4-292DB72C72CB}"/>
+              </a:ext>
+            </a:extLst>
+          </p:cNvPr>
+          <p:cNvSpPr/>
+          <p:nvPr/>
+        </p:nvSpPr>
+        <p:spPr>
+          <a:xfrm rot="17145457">
+            <a:off x="3387875" y="3361786"/>
+            <a:ext cx="278329" cy="1896656"/>
+          </a:xfrm>
+          <a:prstGeom prst="can">
+            <a:avLst/>
+          </a:prstGeom>
+          <a:solidFill>
+            <a:srgbClr val="FFC000"/>
+          </a:solidFill>
+        </p:spPr>
+        <p:style>
+          <a:lnRef idx="2">
+            <a:schemeClr val="accent1">
+              <a:shade val="50000"/>
+            </a:schemeClr>
+          </a:lnRef>
+          <a:fillRef idx="1">
+            <a:schemeClr val="accent1"/>
+          </a:fillRef>
+          <a:effectRef idx="0">
+            <a:schemeClr val="accent1"/>
+          </a:effectRef>
+          <a:fontRef idx="minor">
+            <a:schemeClr val="lt1"/>
+          </a:fontRef>
+        </p:style>
+        <p:txBody>
+          <a:bodyPr rtlCol="0" anchor="ctr"/>
+          <a:lstStyle/>
+          <a:p>
+            <a:pPr algn="ctr"/>
+            <a:endParaRPr lang="en-US"/>
+          </a:p>
+        </p:txBody>
+      </p:sp>
+      <p:sp>
+        <p:nvSpPr>
+          <p:cNvPr id="47" name="TextBox 46">
+            <a:extLst>
+              <a:ext uri="{FF2B5EF4-FFF2-40B4-BE49-F238E27FC236}">
+                <a16:creationId xmlns:a16="http://schemas.microsoft.com/office/drawing/2014/main" id="{C4DC875C-F8AF-7247-BB11-C44C02CFB0F8}"/>
+              </a:ext>
+            </a:extLst>
+          </p:cNvPr>
+          <p:cNvSpPr txBox="1"/>
+          <p:nvPr/>
+        </p:nvSpPr>
+        <p:spPr>
+          <a:xfrm rot="987599">
+            <a:off x="2694863" y="4129969"/>
+            <a:ext cx="1636923" cy="369332"/>
+          </a:xfrm>
+          <a:prstGeom prst="rect">
+            <a:avLst/>
+          </a:prstGeom>
+          <a:noFill/>
+        </p:spPr>
+        <p:txBody>
+          <a:bodyPr wrap="none" rtlCol="0">
+            <a:spAutoFit/>
+          </a:bodyPr>
+          <a:lstStyle/>
+          <a:p>
+            <a:r>
+              <a:rPr lang="en-US" dirty="0">
+                <a:solidFill>
+                  <a:srgbClr val="FF0000"/>
+                </a:solidFill>
+              </a:rPr>
+              <a:t>HTTPS(SSL/TLS)</a:t>
+            </a:r>
+          </a:p>
+        </p:txBody>
+      </p:sp>
+      <p:pic>
+        <p:nvPicPr>
+          <p:cNvPr id="10" name="Picture 9">
+            <a:extLst>
+              <a:ext uri="{FF2B5EF4-FFF2-40B4-BE49-F238E27FC236}">
+                <a16:creationId xmlns:a16="http://schemas.microsoft.com/office/drawing/2014/main" id="{60533E61-6327-7D41-8705-4A8F7AE7B46E}"/>
+              </a:ext>
+            </a:extLst>
+          </p:cNvPr>
+          <p:cNvPicPr>
+            <a:picLocks noChangeAspect="1"/>
+          </p:cNvPicPr>
+          <p:nvPr/>
+        </p:nvPicPr>
+        <p:blipFill>
+          <a:blip r:embed="rId9"/>
+          <a:stretch>
+            <a:fillRect/>
+          </a:stretch>
+        </p:blipFill>
+        <p:spPr>
+          <a:xfrm>
+            <a:off x="4877412" y="550874"/>
+            <a:ext cx="1057298" cy="962260"/>
+          </a:xfrm>
+          <a:prstGeom prst="rect">
+            <a:avLst/>
+          </a:prstGeom>
+        </p:spPr>
+      </p:pic>
+      <p:sp>
+        <p:nvSpPr>
+          <p:cNvPr id="43" name="Rounded Rectangular Callout 42">
+            <a:extLst>
+              <a:ext uri="{FF2B5EF4-FFF2-40B4-BE49-F238E27FC236}">
+                <a16:creationId xmlns:a16="http://schemas.microsoft.com/office/drawing/2014/main" id="{49C0A9DF-B6E6-BA4F-B4A3-EEE46F2CEFA8}"/>
+              </a:ext>
+            </a:extLst>
+          </p:cNvPr>
+          <p:cNvSpPr/>
+          <p:nvPr/>
+        </p:nvSpPr>
+        <p:spPr>
+          <a:xfrm>
+            <a:off x="789171" y="91955"/>
+            <a:ext cx="3919193" cy="1033994"/>
+          </a:xfrm>
+          <a:prstGeom prst="wedgeRoundRectCallout">
+            <a:avLst>
+              <a:gd name="adj1" fmla="val 58603"/>
+              <a:gd name="adj2" fmla="val 37050"/>
+              <a:gd name="adj3" fmla="val 16667"/>
+            </a:avLst>
+          </a:prstGeom>
+          <a:noFill/>
+          <a:ln w="38100">
+            <a:solidFill>
+              <a:schemeClr val="tx1"/>
+            </a:solidFill>
+          </a:ln>
+        </p:spPr>
+        <p:style>
+          <a:lnRef idx="2">
+            <a:schemeClr val="accent1">
+              <a:shade val="50000"/>
+            </a:schemeClr>
+          </a:lnRef>
+          <a:fillRef idx="1">
+            <a:schemeClr val="accent1"/>
+          </a:fillRef>
+          <a:effectRef idx="0">
+            <a:schemeClr val="accent1"/>
+          </a:effectRef>
+          <a:fontRef idx="minor">
+            <a:schemeClr val="lt1"/>
+          </a:fontRef>
+        </p:style>
+        <p:txBody>
+          <a:bodyPr rtlCol="0" anchor="ctr"/>
+          <a:lstStyle/>
+          <a:p>
+            <a:r>
+              <a:rPr lang="en-US" dirty="0">
+                <a:solidFill>
+                  <a:schemeClr val="tx1"/>
+                </a:solidFill>
+              </a:rPr>
+              <a:t>But how about the user data in cloud platform? </a:t>
+            </a:r>
+            <a:r>
+              <a:rPr lang="en-US" b="1" dirty="0">
+                <a:solidFill>
+                  <a:srgbClr val="FF0000"/>
+                </a:solidFill>
+              </a:rPr>
+              <a:t>Are the app provider and cloud platform provider truly trusted?</a:t>
+            </a:r>
+          </a:p>
+        </p:txBody>
+      </p:sp>
+      <p:sp>
+        <p:nvSpPr>
+          <p:cNvPr id="48" name="Rounded Rectangular Callout 47">
+            <a:extLst>
+              <a:ext uri="{FF2B5EF4-FFF2-40B4-BE49-F238E27FC236}">
+                <a16:creationId xmlns:a16="http://schemas.microsoft.com/office/drawing/2014/main" id="{1E7CB0AE-EFD7-F14A-8CC5-A94C1E9E2BB5}"/>
+              </a:ext>
+            </a:extLst>
+          </p:cNvPr>
+          <p:cNvSpPr/>
+          <p:nvPr/>
+        </p:nvSpPr>
+        <p:spPr>
+          <a:xfrm>
+            <a:off x="651702" y="5041114"/>
+            <a:ext cx="3386838" cy="839399"/>
+          </a:xfrm>
+          <a:prstGeom prst="wedgeRoundRectCallout">
+            <a:avLst>
+              <a:gd name="adj1" fmla="val -40659"/>
+              <a:gd name="adj2" fmla="val -93225"/>
+              <a:gd name="adj3" fmla="val 16667"/>
+            </a:avLst>
+          </a:prstGeom>
+          <a:noFill/>
+          <a:ln w="38100">
+            <a:solidFill>
+              <a:schemeClr val="tx1"/>
+            </a:solidFill>
+          </a:ln>
+        </p:spPr>
+        <p:style>
+          <a:lnRef idx="2">
+            <a:schemeClr val="accent1">
+              <a:shade val="50000"/>
+            </a:schemeClr>
+          </a:lnRef>
+          <a:fillRef idx="1">
+            <a:schemeClr val="accent1"/>
+          </a:fillRef>
+          <a:effectRef idx="0">
+            <a:schemeClr val="accent1"/>
+          </a:effectRef>
+          <a:fontRef idx="minor">
+            <a:schemeClr val="lt1"/>
+          </a:fontRef>
+        </p:style>
+        <p:txBody>
+          <a:bodyPr rtlCol="0" anchor="ctr"/>
+          <a:lstStyle/>
+          <a:p>
+            <a:r>
+              <a:rPr lang="en-US" dirty="0">
+                <a:solidFill>
+                  <a:schemeClr val="tx1"/>
+                </a:solidFill>
+              </a:rPr>
+              <a:t>Also  how about the user data in browsers? This may be observed by malware?</a:t>
+            </a:r>
+          </a:p>
+        </p:txBody>
+      </p:sp>
+      <p:pic>
+        <p:nvPicPr>
+          <p:cNvPr id="49" name="Picture 48">
+            <a:extLst>
+              <a:ext uri="{FF2B5EF4-FFF2-40B4-BE49-F238E27FC236}">
+                <a16:creationId xmlns:a16="http://schemas.microsoft.com/office/drawing/2014/main" id="{EA7CB67F-EAAA-F046-A987-550537AE9C70}"/>
+              </a:ext>
+            </a:extLst>
+          </p:cNvPr>
+          <p:cNvPicPr>
+            <a:picLocks noChangeAspect="1"/>
+          </p:cNvPicPr>
+          <p:nvPr/>
+        </p:nvPicPr>
+        <p:blipFill>
+          <a:blip r:embed="rId9"/>
+          <a:stretch>
+            <a:fillRect/>
+          </a:stretch>
+        </p:blipFill>
+        <p:spPr>
+          <a:xfrm>
+            <a:off x="463719" y="4014323"/>
+            <a:ext cx="1057298" cy="962260"/>
+          </a:xfrm>
+          <a:prstGeom prst="rect">
+            <a:avLst/>
+          </a:prstGeom>
+        </p:spPr>
+      </p:pic>
+    </p:spTree>
+    <p:extLst>
+      <p:ext uri="{BB962C8B-B14F-4D97-AF65-F5344CB8AC3E}">
+        <p14:creationId xmlns:p14="http://schemas.microsoft.com/office/powerpoint/2010/main" val="2594138893"/>
       </p:ext>
     </p:extLst>
   </p:cSld>

</xml_diff>